<commit_message>
vignettes: referenced to each other and in ReadMe. Package schematic updated.
</commit_message>
<xml_diff>
--- a/localtests/CreateVignettes/PackageSchematic.pptx
+++ b/localtests/CreateVignettes/PackageSchematic.pptx
@@ -2,18 +2,18 @@
 <file path=ppt/presentation.xml><?xml version="1.0" encoding="utf-8"?>
 <p:presentation xmlns:a="http://schemas.openxmlformats.org/drawingml/2006/main" xmlns:r="http://schemas.openxmlformats.org/officeDocument/2006/relationships" xmlns:p="http://schemas.openxmlformats.org/presentationml/2006/main" saveSubsetFonts="1">
   <p:sldMasterIdLst>
-    <p:sldMasterId id="2147483696" r:id="rId1"/>
+    <p:sldMasterId id="2147483720" r:id="rId1"/>
   </p:sldMasterIdLst>
   <p:sldIdLst>
     <p:sldId id="256" r:id="rId2"/>
   </p:sldIdLst>
-  <p:sldSz cx="9001125" cy="4679950"/>
+  <p:sldSz cx="9001125" cy="5580063"/>
   <p:notesSz cx="6858000" cy="9144000"/>
   <p:defaultTextStyle>
     <a:defPPr>
-      <a:defRPr lang="de-DE"/>
+      <a:defRPr lang="en-US"/>
     </a:defPPr>
-    <a:lvl1pPr marL="0" algn="l" defTabSz="914400" rtl="0" eaLnBrk="1" latinLnBrk="0" hangingPunct="1">
+    <a:lvl1pPr marL="0" algn="l" defTabSz="457200" rtl="0" eaLnBrk="1" latinLnBrk="0" hangingPunct="1">
       <a:defRPr sz="1800" kern="1200">
         <a:solidFill>
           <a:schemeClr val="tx1"/>
@@ -23,7 +23,7 @@
         <a:cs typeface="+mn-cs"/>
       </a:defRPr>
     </a:lvl1pPr>
-    <a:lvl2pPr marL="457200" algn="l" defTabSz="914400" rtl="0" eaLnBrk="1" latinLnBrk="0" hangingPunct="1">
+    <a:lvl2pPr marL="457200" algn="l" defTabSz="457200" rtl="0" eaLnBrk="1" latinLnBrk="0" hangingPunct="1">
       <a:defRPr sz="1800" kern="1200">
         <a:solidFill>
           <a:schemeClr val="tx1"/>
@@ -33,7 +33,7 @@
         <a:cs typeface="+mn-cs"/>
       </a:defRPr>
     </a:lvl2pPr>
-    <a:lvl3pPr marL="914400" algn="l" defTabSz="914400" rtl="0" eaLnBrk="1" latinLnBrk="0" hangingPunct="1">
+    <a:lvl3pPr marL="914400" algn="l" defTabSz="457200" rtl="0" eaLnBrk="1" latinLnBrk="0" hangingPunct="1">
       <a:defRPr sz="1800" kern="1200">
         <a:solidFill>
           <a:schemeClr val="tx1"/>
@@ -43,7 +43,7 @@
         <a:cs typeface="+mn-cs"/>
       </a:defRPr>
     </a:lvl3pPr>
-    <a:lvl4pPr marL="1371600" algn="l" defTabSz="914400" rtl="0" eaLnBrk="1" latinLnBrk="0" hangingPunct="1">
+    <a:lvl4pPr marL="1371600" algn="l" defTabSz="457200" rtl="0" eaLnBrk="1" latinLnBrk="0" hangingPunct="1">
       <a:defRPr sz="1800" kern="1200">
         <a:solidFill>
           <a:schemeClr val="tx1"/>
@@ -53,7 +53,7 @@
         <a:cs typeface="+mn-cs"/>
       </a:defRPr>
     </a:lvl4pPr>
-    <a:lvl5pPr marL="1828800" algn="l" defTabSz="914400" rtl="0" eaLnBrk="1" latinLnBrk="0" hangingPunct="1">
+    <a:lvl5pPr marL="1828800" algn="l" defTabSz="457200" rtl="0" eaLnBrk="1" latinLnBrk="0" hangingPunct="1">
       <a:defRPr sz="1800" kern="1200">
         <a:solidFill>
           <a:schemeClr val="tx1"/>
@@ -63,7 +63,7 @@
         <a:cs typeface="+mn-cs"/>
       </a:defRPr>
     </a:lvl5pPr>
-    <a:lvl6pPr marL="2286000" algn="l" defTabSz="914400" rtl="0" eaLnBrk="1" latinLnBrk="0" hangingPunct="1">
+    <a:lvl6pPr marL="2286000" algn="l" defTabSz="457200" rtl="0" eaLnBrk="1" latinLnBrk="0" hangingPunct="1">
       <a:defRPr sz="1800" kern="1200">
         <a:solidFill>
           <a:schemeClr val="tx1"/>
@@ -73,7 +73,7 @@
         <a:cs typeface="+mn-cs"/>
       </a:defRPr>
     </a:lvl6pPr>
-    <a:lvl7pPr marL="2743200" algn="l" defTabSz="914400" rtl="0" eaLnBrk="1" latinLnBrk="0" hangingPunct="1">
+    <a:lvl7pPr marL="2743200" algn="l" defTabSz="457200" rtl="0" eaLnBrk="1" latinLnBrk="0" hangingPunct="1">
       <a:defRPr sz="1800" kern="1200">
         <a:solidFill>
           <a:schemeClr val="tx1"/>
@@ -83,7 +83,7 @@
         <a:cs typeface="+mn-cs"/>
       </a:defRPr>
     </a:lvl7pPr>
-    <a:lvl8pPr marL="3200400" algn="l" defTabSz="914400" rtl="0" eaLnBrk="1" latinLnBrk="0" hangingPunct="1">
+    <a:lvl8pPr marL="3200400" algn="l" defTabSz="457200" rtl="0" eaLnBrk="1" latinLnBrk="0" hangingPunct="1">
       <a:defRPr sz="1800" kern="1200">
         <a:solidFill>
           <a:schemeClr val="tx1"/>
@@ -93,7 +93,7 @@
         <a:cs typeface="+mn-cs"/>
       </a:defRPr>
     </a:lvl8pPr>
-    <a:lvl9pPr marL="3657600" algn="l" defTabSz="914400" rtl="0" eaLnBrk="1" latinLnBrk="0" hangingPunct="1">
+    <a:lvl9pPr marL="3657600" algn="l" defTabSz="457200" rtl="0" eaLnBrk="1" latinLnBrk="0" hangingPunct="1">
       <a:defRPr sz="1800" kern="1200">
         <a:solidFill>
           <a:schemeClr val="tx1"/>
@@ -107,7 +107,7 @@
   <p:extLst>
     <p:ext uri="{EFAFB233-063F-42B5-8137-9DF3F51BA10A}">
       <p15:sldGuideLst xmlns:p15="http://schemas.microsoft.com/office/powerpoint/2012/main">
-        <p15:guide id="1" orient="horz" pos="1757" userDrawn="1">
+        <p15:guide id="1" orient="horz" pos="2095" userDrawn="1">
           <p15:clr>
             <a:srgbClr val="A4A3A4"/>
           </p15:clr>
@@ -117,12 +117,12 @@
             <a:srgbClr val="A4A3A4"/>
           </p15:clr>
         </p15:guide>
-        <p15:guide id="3" orient="horz" pos="1475">
+        <p15:guide id="3" orient="horz" pos="1759" userDrawn="1">
           <p15:clr>
             <a:srgbClr val="A4A3A4"/>
           </p15:clr>
         </p15:guide>
-        <p15:guide id="4" pos="2835">
+        <p15:guide id="4" pos="2835" userDrawn="1">
           <p15:clr>
             <a:srgbClr val="A4A3A4"/>
           </p15:clr>
@@ -135,7 +135,7 @@
 
 <file path=ppt/slideLayouts/slideLayout1.xml><?xml version="1.0" encoding="utf-8"?>
 <p:sldLayout xmlns:a="http://schemas.openxmlformats.org/drawingml/2006/main" xmlns:r="http://schemas.openxmlformats.org/officeDocument/2006/relationships" xmlns:p="http://schemas.openxmlformats.org/presentationml/2006/main" type="title" preserve="1">
-  <p:cSld name="Titelfolie">
+  <p:cSld name="Title Slide">
     <p:spTree>
       <p:nvGrpSpPr>
         <p:cNvPr id="1" name=""/>
@@ -162,21 +162,21 @@
         </p:nvSpPr>
         <p:spPr>
           <a:xfrm>
-            <a:off x="1125141" y="765910"/>
-            <a:ext cx="6750844" cy="1629316"/>
+            <a:off x="1125141" y="913219"/>
+            <a:ext cx="6750844" cy="1942689"/>
           </a:xfrm>
         </p:spPr>
         <p:txBody>
           <a:bodyPr anchor="b"/>
           <a:lstStyle>
             <a:lvl1pPr algn="ctr">
-              <a:defRPr sz="4500"/>
+              <a:defRPr sz="4430"/>
             </a:lvl1pPr>
           </a:lstStyle>
           <a:p>
             <a:r>
-              <a:rPr lang="de-DE" smtClean="0"/>
-              <a:t>Titelmasterformat durch Klicken bearbeiten</a:t>
+              <a:rPr lang="en-US"/>
+              <a:t>Click to edit Master title style</a:t>
             </a:r>
             <a:endParaRPr lang="en-US" dirty="0"/>
           </a:p>
@@ -194,8 +194,8 @@
         </p:nvSpPr>
         <p:spPr>
           <a:xfrm>
-            <a:off x="1125141" y="2458060"/>
-            <a:ext cx="6750844" cy="1129904"/>
+            <a:off x="1125141" y="2930825"/>
+            <a:ext cx="6750844" cy="1347223"/>
           </a:xfrm>
         </p:spPr>
         <p:txBody>
@@ -203,45 +203,45 @@
           <a:lstStyle>
             <a:lvl1pPr marL="0" indent="0" algn="ctr">
               <a:buNone/>
-              <a:defRPr sz="1800"/>
+              <a:defRPr sz="1772"/>
             </a:lvl1pPr>
-            <a:lvl2pPr marL="342900" indent="0" algn="ctr">
-              <a:buNone/>
-              <a:defRPr sz="1500"/>
+            <a:lvl2pPr marL="337551" indent="0" algn="ctr">
+              <a:buNone/>
+              <a:defRPr sz="1477"/>
             </a:lvl2pPr>
-            <a:lvl3pPr marL="685800" indent="0" algn="ctr">
-              <a:buNone/>
-              <a:defRPr sz="1350"/>
+            <a:lvl3pPr marL="675102" indent="0" algn="ctr">
+              <a:buNone/>
+              <a:defRPr sz="1329"/>
             </a:lvl3pPr>
-            <a:lvl4pPr marL="1028700" indent="0" algn="ctr">
-              <a:buNone/>
-              <a:defRPr sz="1200"/>
+            <a:lvl4pPr marL="1012652" indent="0" algn="ctr">
+              <a:buNone/>
+              <a:defRPr sz="1181"/>
             </a:lvl4pPr>
-            <a:lvl5pPr marL="1371600" indent="0" algn="ctr">
-              <a:buNone/>
-              <a:defRPr sz="1200"/>
+            <a:lvl5pPr marL="1350203" indent="0" algn="ctr">
+              <a:buNone/>
+              <a:defRPr sz="1181"/>
             </a:lvl5pPr>
-            <a:lvl6pPr marL="1714500" indent="0" algn="ctr">
-              <a:buNone/>
-              <a:defRPr sz="1200"/>
+            <a:lvl6pPr marL="1687754" indent="0" algn="ctr">
+              <a:buNone/>
+              <a:defRPr sz="1181"/>
             </a:lvl6pPr>
-            <a:lvl7pPr marL="2057400" indent="0" algn="ctr">
-              <a:buNone/>
-              <a:defRPr sz="1200"/>
+            <a:lvl7pPr marL="2025305" indent="0" algn="ctr">
+              <a:buNone/>
+              <a:defRPr sz="1181"/>
             </a:lvl7pPr>
-            <a:lvl8pPr marL="2400300" indent="0" algn="ctr">
-              <a:buNone/>
-              <a:defRPr sz="1200"/>
+            <a:lvl8pPr marL="2362855" indent="0" algn="ctr">
+              <a:buNone/>
+              <a:defRPr sz="1181"/>
             </a:lvl8pPr>
-            <a:lvl9pPr marL="2743200" indent="0" algn="ctr">
-              <a:buNone/>
-              <a:defRPr sz="1200"/>
+            <a:lvl9pPr marL="2700406" indent="0" algn="ctr">
+              <a:buNone/>
+              <a:defRPr sz="1181"/>
             </a:lvl9pPr>
           </a:lstStyle>
           <a:p>
             <a:r>
-              <a:rPr lang="de-DE" smtClean="0"/>
-              <a:t>Formatvorlage des Untertitelmasters durch Klicken bearbeiten</a:t>
+              <a:rPr lang="en-US"/>
+              <a:t>Click to edit Master subtitle style</a:t>
             </a:r>
             <a:endParaRPr lang="en-US" dirty="0"/>
           </a:p>
@@ -264,7 +264,7 @@
           <a:p>
             <a:fld id="{300DB245-849F-4AAA-AD3E-676A6FA9CB3B}" type="datetimeFigureOut">
               <a:rPr lang="de-DE" smtClean="0"/>
-              <a:t>09.06.2017</a:t>
+              <a:t>07.04.2019</a:t>
             </a:fld>
             <a:endParaRPr lang="de-DE"/>
           </a:p>
@@ -306,7 +306,7 @@
           <a:p>
             <a:fld id="{09B3A486-8BC0-4F15-8591-77BE555F5E45}" type="slidenum">
               <a:rPr lang="de-DE" smtClean="0"/>
-              <a:t>‹Nr.›</a:t>
+              <a:t>‹#›</a:t>
             </a:fld>
             <a:endParaRPr lang="de-DE"/>
           </a:p>
@@ -315,7 +315,7 @@
     </p:spTree>
     <p:extLst>
       <p:ext uri="{BB962C8B-B14F-4D97-AF65-F5344CB8AC3E}">
-        <p14:creationId xmlns:p14="http://schemas.microsoft.com/office/powerpoint/2010/main" val="1213689000"/>
+        <p14:creationId xmlns:p14="http://schemas.microsoft.com/office/powerpoint/2010/main" val="2262439369"/>
       </p:ext>
     </p:extLst>
   </p:cSld>
@@ -327,7 +327,7 @@
 
 <file path=ppt/slideLayouts/slideLayout10.xml><?xml version="1.0" encoding="utf-8"?>
 <p:sldLayout xmlns:a="http://schemas.openxmlformats.org/drawingml/2006/main" xmlns:r="http://schemas.openxmlformats.org/officeDocument/2006/relationships" xmlns:p="http://schemas.openxmlformats.org/presentationml/2006/main" type="vertTx" preserve="1">
-  <p:cSld name="Titel und vertikaler Text">
+  <p:cSld name="Title and Vertical Text">
     <p:spTree>
       <p:nvGrpSpPr>
         <p:cNvPr id="1" name=""/>
@@ -358,8 +358,8 @@
           <a:lstStyle/>
           <a:p>
             <a:r>
-              <a:rPr lang="de-DE" smtClean="0"/>
-              <a:t>Titelmasterformat durch Klicken bearbeiten</a:t>
+              <a:rPr lang="en-US"/>
+              <a:t>Click to edit Master title style</a:t>
             </a:r>
             <a:endParaRPr lang="en-US" dirty="0"/>
           </a:p>
@@ -382,36 +382,36 @@
           <a:p>
             <a:pPr lvl="0"/>
             <a:r>
-              <a:rPr lang="de-DE" smtClean="0"/>
-              <a:t>Textmasterformat bearbeiten</a:t>
+              <a:rPr lang="en-US"/>
+              <a:t>Click to edit Master text styles</a:t>
             </a:r>
           </a:p>
           <a:p>
             <a:pPr lvl="1"/>
             <a:r>
-              <a:rPr lang="de-DE" smtClean="0"/>
-              <a:t>Zweite Ebene</a:t>
+              <a:rPr lang="en-US"/>
+              <a:t>Second level</a:t>
             </a:r>
           </a:p>
           <a:p>
             <a:pPr lvl="2"/>
             <a:r>
-              <a:rPr lang="de-DE" smtClean="0"/>
-              <a:t>Dritte Ebene</a:t>
+              <a:rPr lang="en-US"/>
+              <a:t>Third level</a:t>
             </a:r>
           </a:p>
           <a:p>
             <a:pPr lvl="3"/>
             <a:r>
-              <a:rPr lang="de-DE" smtClean="0"/>
-              <a:t>Vierte Ebene</a:t>
+              <a:rPr lang="en-US"/>
+              <a:t>Fourth level</a:t>
             </a:r>
           </a:p>
           <a:p>
             <a:pPr lvl="4"/>
             <a:r>
-              <a:rPr lang="de-DE" smtClean="0"/>
-              <a:t>Fünfte Ebene</a:t>
+              <a:rPr lang="en-US"/>
+              <a:t>Fifth level</a:t>
             </a:r>
             <a:endParaRPr lang="en-US" dirty="0"/>
           </a:p>
@@ -434,7 +434,7 @@
           <a:p>
             <a:fld id="{300DB245-849F-4AAA-AD3E-676A6FA9CB3B}" type="datetimeFigureOut">
               <a:rPr lang="de-DE" smtClean="0"/>
-              <a:t>09.06.2017</a:t>
+              <a:t>07.04.2019</a:t>
             </a:fld>
             <a:endParaRPr lang="de-DE"/>
           </a:p>
@@ -476,7 +476,7 @@
           <a:p>
             <a:fld id="{09B3A486-8BC0-4F15-8591-77BE555F5E45}" type="slidenum">
               <a:rPr lang="de-DE" smtClean="0"/>
-              <a:t>‹Nr.›</a:t>
+              <a:t>‹#›</a:t>
             </a:fld>
             <a:endParaRPr lang="de-DE"/>
           </a:p>
@@ -485,7 +485,7 @@
     </p:spTree>
     <p:extLst>
       <p:ext uri="{BB962C8B-B14F-4D97-AF65-F5344CB8AC3E}">
-        <p14:creationId xmlns:p14="http://schemas.microsoft.com/office/powerpoint/2010/main" val="556916641"/>
+        <p14:creationId xmlns:p14="http://schemas.microsoft.com/office/powerpoint/2010/main" val="1943505614"/>
       </p:ext>
     </p:extLst>
   </p:cSld>
@@ -497,7 +497,7 @@
 
 <file path=ppt/slideLayouts/slideLayout11.xml><?xml version="1.0" encoding="utf-8"?>
 <p:sldLayout xmlns:a="http://schemas.openxmlformats.org/drawingml/2006/main" xmlns:r="http://schemas.openxmlformats.org/officeDocument/2006/relationships" xmlns:p="http://schemas.openxmlformats.org/presentationml/2006/main" type="vertTitleAndTx" preserve="1">
-  <p:cSld name="Vertikaler Titel und Text">
+  <p:cSld name="Vertical Title and Text">
     <p:spTree>
       <p:nvGrpSpPr>
         <p:cNvPr id="1" name=""/>
@@ -524,8 +524,8 @@
         </p:nvSpPr>
         <p:spPr>
           <a:xfrm>
-            <a:off x="6441431" y="249170"/>
-            <a:ext cx="1940868" cy="3966041"/>
+            <a:off x="6441430" y="297087"/>
+            <a:ext cx="1940868" cy="4728845"/>
           </a:xfrm>
         </p:spPr>
         <p:txBody>
@@ -533,8 +533,8 @@
           <a:lstStyle/>
           <a:p>
             <a:r>
-              <a:rPr lang="de-DE" smtClean="0"/>
-              <a:t>Titelmasterformat durch Klicken bearbeiten</a:t>
+              <a:rPr lang="en-US"/>
+              <a:t>Click to edit Master title style</a:t>
             </a:r>
             <a:endParaRPr lang="en-US" dirty="0"/>
           </a:p>
@@ -552,8 +552,8 @@
         </p:nvSpPr>
         <p:spPr>
           <a:xfrm>
-            <a:off x="618831" y="249170"/>
-            <a:ext cx="5710089" cy="3966041"/>
+            <a:off x="618827" y="297087"/>
+            <a:ext cx="5710089" cy="4728845"/>
           </a:xfrm>
         </p:spPr>
         <p:txBody>
@@ -562,36 +562,36 @@
           <a:p>
             <a:pPr lvl="0"/>
             <a:r>
-              <a:rPr lang="de-DE" smtClean="0"/>
-              <a:t>Textmasterformat bearbeiten</a:t>
+              <a:rPr lang="en-US"/>
+              <a:t>Click to edit Master text styles</a:t>
             </a:r>
           </a:p>
           <a:p>
             <a:pPr lvl="1"/>
             <a:r>
-              <a:rPr lang="de-DE" smtClean="0"/>
-              <a:t>Zweite Ebene</a:t>
+              <a:rPr lang="en-US"/>
+              <a:t>Second level</a:t>
             </a:r>
           </a:p>
           <a:p>
             <a:pPr lvl="2"/>
             <a:r>
-              <a:rPr lang="de-DE" smtClean="0"/>
-              <a:t>Dritte Ebene</a:t>
+              <a:rPr lang="en-US"/>
+              <a:t>Third level</a:t>
             </a:r>
           </a:p>
           <a:p>
             <a:pPr lvl="3"/>
             <a:r>
-              <a:rPr lang="de-DE" smtClean="0"/>
-              <a:t>Vierte Ebene</a:t>
+              <a:rPr lang="en-US"/>
+              <a:t>Fourth level</a:t>
             </a:r>
           </a:p>
           <a:p>
             <a:pPr lvl="4"/>
             <a:r>
-              <a:rPr lang="de-DE" smtClean="0"/>
-              <a:t>Fünfte Ebene</a:t>
+              <a:rPr lang="en-US"/>
+              <a:t>Fifth level</a:t>
             </a:r>
             <a:endParaRPr lang="en-US" dirty="0"/>
           </a:p>
@@ -614,7 +614,7 @@
           <a:p>
             <a:fld id="{300DB245-849F-4AAA-AD3E-676A6FA9CB3B}" type="datetimeFigureOut">
               <a:rPr lang="de-DE" smtClean="0"/>
-              <a:t>09.06.2017</a:t>
+              <a:t>07.04.2019</a:t>
             </a:fld>
             <a:endParaRPr lang="de-DE"/>
           </a:p>
@@ -656,7 +656,7 @@
           <a:p>
             <a:fld id="{09B3A486-8BC0-4F15-8591-77BE555F5E45}" type="slidenum">
               <a:rPr lang="de-DE" smtClean="0"/>
-              <a:t>‹Nr.›</a:t>
+              <a:t>‹#›</a:t>
             </a:fld>
             <a:endParaRPr lang="de-DE"/>
           </a:p>
@@ -665,7 +665,7 @@
     </p:spTree>
     <p:extLst>
       <p:ext uri="{BB962C8B-B14F-4D97-AF65-F5344CB8AC3E}">
-        <p14:creationId xmlns:p14="http://schemas.microsoft.com/office/powerpoint/2010/main" val="3491475566"/>
+        <p14:creationId xmlns:p14="http://schemas.microsoft.com/office/powerpoint/2010/main" val="1469270086"/>
       </p:ext>
     </p:extLst>
   </p:cSld>
@@ -677,7 +677,7 @@
 
 <file path=ppt/slideLayouts/slideLayout2.xml><?xml version="1.0" encoding="utf-8"?>
 <p:sldLayout xmlns:a="http://schemas.openxmlformats.org/drawingml/2006/main" xmlns:r="http://schemas.openxmlformats.org/officeDocument/2006/relationships" xmlns:p="http://schemas.openxmlformats.org/presentationml/2006/main" type="obj" preserve="1">
-  <p:cSld name="Titel und Inhalt">
+  <p:cSld name="Title and Content">
     <p:spTree>
       <p:nvGrpSpPr>
         <p:cNvPr id="1" name=""/>
@@ -708,8 +708,8 @@
           <a:lstStyle/>
           <a:p>
             <a:r>
-              <a:rPr lang="de-DE" smtClean="0"/>
-              <a:t>Titelmasterformat durch Klicken bearbeiten</a:t>
+              <a:rPr lang="en-US"/>
+              <a:t>Click to edit Master title style</a:t>
             </a:r>
             <a:endParaRPr lang="en-US" dirty="0"/>
           </a:p>
@@ -732,36 +732,36 @@
           <a:p>
             <a:pPr lvl="0"/>
             <a:r>
-              <a:rPr lang="de-DE" smtClean="0"/>
-              <a:t>Textmasterformat bearbeiten</a:t>
+              <a:rPr lang="en-US"/>
+              <a:t>Click to edit Master text styles</a:t>
             </a:r>
           </a:p>
           <a:p>
             <a:pPr lvl="1"/>
             <a:r>
-              <a:rPr lang="de-DE" smtClean="0"/>
-              <a:t>Zweite Ebene</a:t>
+              <a:rPr lang="en-US"/>
+              <a:t>Second level</a:t>
             </a:r>
           </a:p>
           <a:p>
             <a:pPr lvl="2"/>
             <a:r>
-              <a:rPr lang="de-DE" smtClean="0"/>
-              <a:t>Dritte Ebene</a:t>
+              <a:rPr lang="en-US"/>
+              <a:t>Third level</a:t>
             </a:r>
           </a:p>
           <a:p>
             <a:pPr lvl="3"/>
             <a:r>
-              <a:rPr lang="de-DE" smtClean="0"/>
-              <a:t>Vierte Ebene</a:t>
+              <a:rPr lang="en-US"/>
+              <a:t>Fourth level</a:t>
             </a:r>
           </a:p>
           <a:p>
             <a:pPr lvl="4"/>
             <a:r>
-              <a:rPr lang="de-DE" smtClean="0"/>
-              <a:t>Fünfte Ebene</a:t>
+              <a:rPr lang="en-US"/>
+              <a:t>Fifth level</a:t>
             </a:r>
             <a:endParaRPr lang="en-US" dirty="0"/>
           </a:p>
@@ -784,7 +784,7 @@
           <a:p>
             <a:fld id="{300DB245-849F-4AAA-AD3E-676A6FA9CB3B}" type="datetimeFigureOut">
               <a:rPr lang="de-DE" smtClean="0"/>
-              <a:t>09.06.2017</a:t>
+              <a:t>07.04.2019</a:t>
             </a:fld>
             <a:endParaRPr lang="de-DE"/>
           </a:p>
@@ -826,7 +826,7 @@
           <a:p>
             <a:fld id="{09B3A486-8BC0-4F15-8591-77BE555F5E45}" type="slidenum">
               <a:rPr lang="de-DE" smtClean="0"/>
-              <a:t>‹Nr.›</a:t>
+              <a:t>‹#›</a:t>
             </a:fld>
             <a:endParaRPr lang="de-DE"/>
           </a:p>
@@ -835,7 +835,7 @@
     </p:spTree>
     <p:extLst>
       <p:ext uri="{BB962C8B-B14F-4D97-AF65-F5344CB8AC3E}">
-        <p14:creationId xmlns:p14="http://schemas.microsoft.com/office/powerpoint/2010/main" val="2928856839"/>
+        <p14:creationId xmlns:p14="http://schemas.microsoft.com/office/powerpoint/2010/main" val="152203214"/>
       </p:ext>
     </p:extLst>
   </p:cSld>
@@ -847,7 +847,7 @@
 
 <file path=ppt/slideLayouts/slideLayout3.xml><?xml version="1.0" encoding="utf-8"?>
 <p:sldLayout xmlns:a="http://schemas.openxmlformats.org/drawingml/2006/main" xmlns:r="http://schemas.openxmlformats.org/officeDocument/2006/relationships" xmlns:p="http://schemas.openxmlformats.org/presentationml/2006/main" type="secHead" preserve="1">
-  <p:cSld name="Abschnitts-&#10;überschrift">
+  <p:cSld name="Section Header">
     <p:spTree>
       <p:nvGrpSpPr>
         <p:cNvPr id="1" name=""/>
@@ -874,21 +874,21 @@
         </p:nvSpPr>
         <p:spPr>
           <a:xfrm>
-            <a:off x="614140" y="1166744"/>
-            <a:ext cx="7763470" cy="1946729"/>
+            <a:off x="614139" y="1391141"/>
+            <a:ext cx="7763470" cy="2321151"/>
           </a:xfrm>
         </p:spPr>
         <p:txBody>
           <a:bodyPr anchor="b"/>
           <a:lstStyle>
             <a:lvl1pPr>
-              <a:defRPr sz="4500"/>
+              <a:defRPr sz="4430"/>
             </a:lvl1pPr>
           </a:lstStyle>
           <a:p>
             <a:r>
-              <a:rPr lang="de-DE" smtClean="0"/>
-              <a:t>Titelmasterformat durch Klicken bearbeiten</a:t>
+              <a:rPr lang="en-US"/>
+              <a:t>Click to edit Master title style</a:t>
             </a:r>
             <a:endParaRPr lang="en-US" dirty="0"/>
           </a:p>
@@ -906,8 +906,8 @@
         </p:nvSpPr>
         <p:spPr>
           <a:xfrm>
-            <a:off x="614140" y="3131884"/>
-            <a:ext cx="7763470" cy="1023739"/>
+            <a:off x="614139" y="3734251"/>
+            <a:ext cx="7763470" cy="1220638"/>
           </a:xfrm>
         </p:spPr>
         <p:txBody>
@@ -915,7 +915,7 @@
           <a:lstStyle>
             <a:lvl1pPr marL="0" indent="0">
               <a:buNone/>
-              <a:defRPr sz="1800">
+              <a:defRPr sz="1772">
                 <a:solidFill>
                   <a:schemeClr val="tx1">
                     <a:tint val="75000"/>
@@ -923,9 +923,9 @@
                 </a:solidFill>
               </a:defRPr>
             </a:lvl1pPr>
-            <a:lvl2pPr marL="342900" indent="0">
-              <a:buNone/>
-              <a:defRPr sz="1500">
+            <a:lvl2pPr marL="337551" indent="0">
+              <a:buNone/>
+              <a:defRPr sz="1477">
                 <a:solidFill>
                   <a:schemeClr val="tx1">
                     <a:tint val="75000"/>
@@ -933,9 +933,9 @@
                 </a:solidFill>
               </a:defRPr>
             </a:lvl2pPr>
-            <a:lvl3pPr marL="685800" indent="0">
-              <a:buNone/>
-              <a:defRPr sz="1350">
+            <a:lvl3pPr marL="675102" indent="0">
+              <a:buNone/>
+              <a:defRPr sz="1329">
                 <a:solidFill>
                   <a:schemeClr val="tx1">
                     <a:tint val="75000"/>
@@ -943,9 +943,9 @@
                 </a:solidFill>
               </a:defRPr>
             </a:lvl3pPr>
-            <a:lvl4pPr marL="1028700" indent="0">
-              <a:buNone/>
-              <a:defRPr sz="1200">
+            <a:lvl4pPr marL="1012652" indent="0">
+              <a:buNone/>
+              <a:defRPr sz="1181">
                 <a:solidFill>
                   <a:schemeClr val="tx1">
                     <a:tint val="75000"/>
@@ -953,9 +953,9 @@
                 </a:solidFill>
               </a:defRPr>
             </a:lvl4pPr>
-            <a:lvl5pPr marL="1371600" indent="0">
-              <a:buNone/>
-              <a:defRPr sz="1200">
+            <a:lvl5pPr marL="1350203" indent="0">
+              <a:buNone/>
+              <a:defRPr sz="1181">
                 <a:solidFill>
                   <a:schemeClr val="tx1">
                     <a:tint val="75000"/>
@@ -963,9 +963,9 @@
                 </a:solidFill>
               </a:defRPr>
             </a:lvl5pPr>
-            <a:lvl6pPr marL="1714500" indent="0">
-              <a:buNone/>
-              <a:defRPr sz="1200">
+            <a:lvl6pPr marL="1687754" indent="0">
+              <a:buNone/>
+              <a:defRPr sz="1181">
                 <a:solidFill>
                   <a:schemeClr val="tx1">
                     <a:tint val="75000"/>
@@ -973,9 +973,9 @@
                 </a:solidFill>
               </a:defRPr>
             </a:lvl6pPr>
-            <a:lvl7pPr marL="2057400" indent="0">
-              <a:buNone/>
-              <a:defRPr sz="1200">
+            <a:lvl7pPr marL="2025305" indent="0">
+              <a:buNone/>
+              <a:defRPr sz="1181">
                 <a:solidFill>
                   <a:schemeClr val="tx1">
                     <a:tint val="75000"/>
@@ -983,9 +983,9 @@
                 </a:solidFill>
               </a:defRPr>
             </a:lvl7pPr>
-            <a:lvl8pPr marL="2400300" indent="0">
-              <a:buNone/>
-              <a:defRPr sz="1200">
+            <a:lvl8pPr marL="2362855" indent="0">
+              <a:buNone/>
+              <a:defRPr sz="1181">
                 <a:solidFill>
                   <a:schemeClr val="tx1">
                     <a:tint val="75000"/>
@@ -993,9 +993,9 @@
                 </a:solidFill>
               </a:defRPr>
             </a:lvl8pPr>
-            <a:lvl9pPr marL="2743200" indent="0">
-              <a:buNone/>
-              <a:defRPr sz="1200">
+            <a:lvl9pPr marL="2700406" indent="0">
+              <a:buNone/>
+              <a:defRPr sz="1181">
                 <a:solidFill>
                   <a:schemeClr val="tx1">
                     <a:tint val="75000"/>
@@ -1007,8 +1007,8 @@
           <a:p>
             <a:pPr lvl="0"/>
             <a:r>
-              <a:rPr lang="de-DE" smtClean="0"/>
-              <a:t>Textmasterformat bearbeiten</a:t>
+              <a:rPr lang="en-US"/>
+              <a:t>Click to edit Master text styles</a:t>
             </a:r>
           </a:p>
         </p:txBody>
@@ -1030,7 +1030,7 @@
           <a:p>
             <a:fld id="{300DB245-849F-4AAA-AD3E-676A6FA9CB3B}" type="datetimeFigureOut">
               <a:rPr lang="de-DE" smtClean="0"/>
-              <a:t>09.06.2017</a:t>
+              <a:t>07.04.2019</a:t>
             </a:fld>
             <a:endParaRPr lang="de-DE"/>
           </a:p>
@@ -1072,7 +1072,7 @@
           <a:p>
             <a:fld id="{09B3A486-8BC0-4F15-8591-77BE555F5E45}" type="slidenum">
               <a:rPr lang="de-DE" smtClean="0"/>
-              <a:t>‹Nr.›</a:t>
+              <a:t>‹#›</a:t>
             </a:fld>
             <a:endParaRPr lang="de-DE"/>
           </a:p>
@@ -1081,7 +1081,7 @@
     </p:spTree>
     <p:extLst>
       <p:ext uri="{BB962C8B-B14F-4D97-AF65-F5344CB8AC3E}">
-        <p14:creationId xmlns:p14="http://schemas.microsoft.com/office/powerpoint/2010/main" val="4222419057"/>
+        <p14:creationId xmlns:p14="http://schemas.microsoft.com/office/powerpoint/2010/main" val="646759953"/>
       </p:ext>
     </p:extLst>
   </p:cSld>
@@ -1093,7 +1093,7 @@
 
 <file path=ppt/slideLayouts/slideLayout4.xml><?xml version="1.0" encoding="utf-8"?>
 <p:sldLayout xmlns:a="http://schemas.openxmlformats.org/drawingml/2006/main" xmlns:r="http://schemas.openxmlformats.org/officeDocument/2006/relationships" xmlns:p="http://schemas.openxmlformats.org/presentationml/2006/main" type="twoObj" preserve="1">
-  <p:cSld name="Zwei Inhalte">
+  <p:cSld name="Two Content">
     <p:spTree>
       <p:nvGrpSpPr>
         <p:cNvPr id="1" name=""/>
@@ -1124,8 +1124,8 @@
           <a:lstStyle/>
           <a:p>
             <a:r>
-              <a:rPr lang="de-DE" smtClean="0"/>
-              <a:t>Titelmasterformat durch Klicken bearbeiten</a:t>
+              <a:rPr lang="en-US"/>
+              <a:t>Click to edit Master title style</a:t>
             </a:r>
             <a:endParaRPr lang="en-US" dirty="0"/>
           </a:p>
@@ -1143,8 +1143,8 @@
         </p:nvSpPr>
         <p:spPr>
           <a:xfrm>
-            <a:off x="618827" y="1245825"/>
-            <a:ext cx="3825478" cy="2969386"/>
+            <a:off x="618827" y="1485433"/>
+            <a:ext cx="3825478" cy="3540499"/>
           </a:xfrm>
         </p:spPr>
         <p:txBody>
@@ -1153,36 +1153,36 @@
           <a:p>
             <a:pPr lvl="0"/>
             <a:r>
-              <a:rPr lang="de-DE" smtClean="0"/>
-              <a:t>Textmasterformat bearbeiten</a:t>
+              <a:rPr lang="en-US"/>
+              <a:t>Click to edit Master text styles</a:t>
             </a:r>
           </a:p>
           <a:p>
             <a:pPr lvl="1"/>
             <a:r>
-              <a:rPr lang="de-DE" smtClean="0"/>
-              <a:t>Zweite Ebene</a:t>
+              <a:rPr lang="en-US"/>
+              <a:t>Second level</a:t>
             </a:r>
           </a:p>
           <a:p>
             <a:pPr lvl="2"/>
             <a:r>
-              <a:rPr lang="de-DE" smtClean="0"/>
-              <a:t>Dritte Ebene</a:t>
+              <a:rPr lang="en-US"/>
+              <a:t>Third level</a:t>
             </a:r>
           </a:p>
           <a:p>
             <a:pPr lvl="3"/>
             <a:r>
-              <a:rPr lang="de-DE" smtClean="0"/>
-              <a:t>Vierte Ebene</a:t>
+              <a:rPr lang="en-US"/>
+              <a:t>Fourth level</a:t>
             </a:r>
           </a:p>
           <a:p>
             <a:pPr lvl="4"/>
             <a:r>
-              <a:rPr lang="de-DE" smtClean="0"/>
-              <a:t>Fünfte Ebene</a:t>
+              <a:rPr lang="en-US"/>
+              <a:t>Fifth level</a:t>
             </a:r>
             <a:endParaRPr lang="en-US" dirty="0"/>
           </a:p>
@@ -1200,8 +1200,8 @@
         </p:nvSpPr>
         <p:spPr>
           <a:xfrm>
-            <a:off x="4556820" y="1245825"/>
-            <a:ext cx="3825478" cy="2969386"/>
+            <a:off x="4556820" y="1485433"/>
+            <a:ext cx="3825478" cy="3540499"/>
           </a:xfrm>
         </p:spPr>
         <p:txBody>
@@ -1210,36 +1210,36 @@
           <a:p>
             <a:pPr lvl="0"/>
             <a:r>
-              <a:rPr lang="de-DE" smtClean="0"/>
-              <a:t>Textmasterformat bearbeiten</a:t>
+              <a:rPr lang="en-US"/>
+              <a:t>Click to edit Master text styles</a:t>
             </a:r>
           </a:p>
           <a:p>
             <a:pPr lvl="1"/>
             <a:r>
-              <a:rPr lang="de-DE" smtClean="0"/>
-              <a:t>Zweite Ebene</a:t>
+              <a:rPr lang="en-US"/>
+              <a:t>Second level</a:t>
             </a:r>
           </a:p>
           <a:p>
             <a:pPr lvl="2"/>
             <a:r>
-              <a:rPr lang="de-DE" smtClean="0"/>
-              <a:t>Dritte Ebene</a:t>
+              <a:rPr lang="en-US"/>
+              <a:t>Third level</a:t>
             </a:r>
           </a:p>
           <a:p>
             <a:pPr lvl="3"/>
             <a:r>
-              <a:rPr lang="de-DE" smtClean="0"/>
-              <a:t>Vierte Ebene</a:t>
+              <a:rPr lang="en-US"/>
+              <a:t>Fourth level</a:t>
             </a:r>
           </a:p>
           <a:p>
             <a:pPr lvl="4"/>
             <a:r>
-              <a:rPr lang="de-DE" smtClean="0"/>
-              <a:t>Fünfte Ebene</a:t>
+              <a:rPr lang="en-US"/>
+              <a:t>Fifth level</a:t>
             </a:r>
             <a:endParaRPr lang="en-US" dirty="0"/>
           </a:p>
@@ -1262,7 +1262,7 @@
           <a:p>
             <a:fld id="{300DB245-849F-4AAA-AD3E-676A6FA9CB3B}" type="datetimeFigureOut">
               <a:rPr lang="de-DE" smtClean="0"/>
-              <a:t>09.06.2017</a:t>
+              <a:t>07.04.2019</a:t>
             </a:fld>
             <a:endParaRPr lang="de-DE"/>
           </a:p>
@@ -1304,7 +1304,7 @@
           <a:p>
             <a:fld id="{09B3A486-8BC0-4F15-8591-77BE555F5E45}" type="slidenum">
               <a:rPr lang="de-DE" smtClean="0"/>
-              <a:t>‹Nr.›</a:t>
+              <a:t>‹#›</a:t>
             </a:fld>
             <a:endParaRPr lang="de-DE"/>
           </a:p>
@@ -1313,7 +1313,7 @@
     </p:spTree>
     <p:extLst>
       <p:ext uri="{BB962C8B-B14F-4D97-AF65-F5344CB8AC3E}">
-        <p14:creationId xmlns:p14="http://schemas.microsoft.com/office/powerpoint/2010/main" val="2268316149"/>
+        <p14:creationId xmlns:p14="http://schemas.microsoft.com/office/powerpoint/2010/main" val="2883158856"/>
       </p:ext>
     </p:extLst>
   </p:cSld>
@@ -1325,7 +1325,7 @@
 
 <file path=ppt/slideLayouts/slideLayout5.xml><?xml version="1.0" encoding="utf-8"?>
 <p:sldLayout xmlns:a="http://schemas.openxmlformats.org/drawingml/2006/main" xmlns:r="http://schemas.openxmlformats.org/officeDocument/2006/relationships" xmlns:p="http://schemas.openxmlformats.org/presentationml/2006/main" type="twoTxTwoObj" preserve="1">
-  <p:cSld name="Vergleich">
+  <p:cSld name="Comparison">
     <p:spTree>
       <p:nvGrpSpPr>
         <p:cNvPr id="1" name=""/>
@@ -1352,8 +1352,8 @@
         </p:nvSpPr>
         <p:spPr>
           <a:xfrm>
-            <a:off x="620000" y="249166"/>
-            <a:ext cx="7763470" cy="904574"/>
+            <a:off x="620000" y="297087"/>
+            <a:ext cx="7763470" cy="1078554"/>
           </a:xfrm>
         </p:spPr>
         <p:txBody>
@@ -1361,8 +1361,8 @@
           <a:lstStyle/>
           <a:p>
             <a:r>
-              <a:rPr lang="de-DE" smtClean="0"/>
-              <a:t>Titelmasterformat durch Klicken bearbeiten</a:t>
+              <a:rPr lang="en-US"/>
+              <a:t>Click to edit Master title style</a:t>
             </a:r>
             <a:endParaRPr lang="en-US" dirty="0"/>
           </a:p>
@@ -1380,8 +1380,8 @@
         </p:nvSpPr>
         <p:spPr>
           <a:xfrm>
-            <a:off x="620001" y="1147241"/>
-            <a:ext cx="3807897" cy="562243"/>
+            <a:off x="620000" y="1367891"/>
+            <a:ext cx="3807897" cy="670382"/>
           </a:xfrm>
         </p:spPr>
         <p:txBody>
@@ -1389,46 +1389,46 @@
           <a:lstStyle>
             <a:lvl1pPr marL="0" indent="0">
               <a:buNone/>
-              <a:defRPr sz="1800" b="1"/>
+              <a:defRPr sz="1772" b="1"/>
             </a:lvl1pPr>
-            <a:lvl2pPr marL="342900" indent="0">
-              <a:buNone/>
-              <a:defRPr sz="1500" b="1"/>
+            <a:lvl2pPr marL="337551" indent="0">
+              <a:buNone/>
+              <a:defRPr sz="1477" b="1"/>
             </a:lvl2pPr>
-            <a:lvl3pPr marL="685800" indent="0">
-              <a:buNone/>
-              <a:defRPr sz="1350" b="1"/>
+            <a:lvl3pPr marL="675102" indent="0">
+              <a:buNone/>
+              <a:defRPr sz="1329" b="1"/>
             </a:lvl3pPr>
-            <a:lvl4pPr marL="1028700" indent="0">
-              <a:buNone/>
-              <a:defRPr sz="1200" b="1"/>
+            <a:lvl4pPr marL="1012652" indent="0">
+              <a:buNone/>
+              <a:defRPr sz="1181" b="1"/>
             </a:lvl4pPr>
-            <a:lvl5pPr marL="1371600" indent="0">
-              <a:buNone/>
-              <a:defRPr sz="1200" b="1"/>
+            <a:lvl5pPr marL="1350203" indent="0">
+              <a:buNone/>
+              <a:defRPr sz="1181" b="1"/>
             </a:lvl5pPr>
-            <a:lvl6pPr marL="1714500" indent="0">
-              <a:buNone/>
-              <a:defRPr sz="1200" b="1"/>
+            <a:lvl6pPr marL="1687754" indent="0">
+              <a:buNone/>
+              <a:defRPr sz="1181" b="1"/>
             </a:lvl6pPr>
-            <a:lvl7pPr marL="2057400" indent="0">
-              <a:buNone/>
-              <a:defRPr sz="1200" b="1"/>
+            <a:lvl7pPr marL="2025305" indent="0">
+              <a:buNone/>
+              <a:defRPr sz="1181" b="1"/>
             </a:lvl7pPr>
-            <a:lvl8pPr marL="2400300" indent="0">
-              <a:buNone/>
-              <a:defRPr sz="1200" b="1"/>
+            <a:lvl8pPr marL="2362855" indent="0">
+              <a:buNone/>
+              <a:defRPr sz="1181" b="1"/>
             </a:lvl8pPr>
-            <a:lvl9pPr marL="2743200" indent="0">
-              <a:buNone/>
-              <a:defRPr sz="1200" b="1"/>
+            <a:lvl9pPr marL="2700406" indent="0">
+              <a:buNone/>
+              <a:defRPr sz="1181" b="1"/>
             </a:lvl9pPr>
           </a:lstStyle>
           <a:p>
             <a:pPr lvl="0"/>
             <a:r>
-              <a:rPr lang="de-DE" smtClean="0"/>
-              <a:t>Textmasterformat bearbeiten</a:t>
+              <a:rPr lang="en-US"/>
+              <a:t>Click to edit Master text styles</a:t>
             </a:r>
           </a:p>
         </p:txBody>
@@ -1445,8 +1445,8 @@
         </p:nvSpPr>
         <p:spPr>
           <a:xfrm>
-            <a:off x="620001" y="1709484"/>
-            <a:ext cx="3807897" cy="2514390"/>
+            <a:off x="620000" y="2038273"/>
+            <a:ext cx="3807897" cy="2997993"/>
           </a:xfrm>
         </p:spPr>
         <p:txBody>
@@ -1455,36 +1455,36 @@
           <a:p>
             <a:pPr lvl="0"/>
             <a:r>
-              <a:rPr lang="de-DE" smtClean="0"/>
-              <a:t>Textmasterformat bearbeiten</a:t>
+              <a:rPr lang="en-US"/>
+              <a:t>Click to edit Master text styles</a:t>
             </a:r>
           </a:p>
           <a:p>
             <a:pPr lvl="1"/>
             <a:r>
-              <a:rPr lang="de-DE" smtClean="0"/>
-              <a:t>Zweite Ebene</a:t>
+              <a:rPr lang="en-US"/>
+              <a:t>Second level</a:t>
             </a:r>
           </a:p>
           <a:p>
             <a:pPr lvl="2"/>
             <a:r>
-              <a:rPr lang="de-DE" smtClean="0"/>
-              <a:t>Dritte Ebene</a:t>
+              <a:rPr lang="en-US"/>
+              <a:t>Third level</a:t>
             </a:r>
           </a:p>
           <a:p>
             <a:pPr lvl="3"/>
             <a:r>
-              <a:rPr lang="de-DE" smtClean="0"/>
-              <a:t>Vierte Ebene</a:t>
+              <a:rPr lang="en-US"/>
+              <a:t>Fourth level</a:t>
             </a:r>
           </a:p>
           <a:p>
             <a:pPr lvl="4"/>
             <a:r>
-              <a:rPr lang="de-DE" smtClean="0"/>
-              <a:t>Fünfte Ebene</a:t>
+              <a:rPr lang="en-US"/>
+              <a:t>Fifth level</a:t>
             </a:r>
             <a:endParaRPr lang="en-US" dirty="0"/>
           </a:p>
@@ -1502,8 +1502,8 @@
         </p:nvSpPr>
         <p:spPr>
           <a:xfrm>
-            <a:off x="4556827" y="1147241"/>
-            <a:ext cx="3826651" cy="562243"/>
+            <a:off x="4556819" y="1367891"/>
+            <a:ext cx="3826651" cy="670382"/>
           </a:xfrm>
         </p:spPr>
         <p:txBody>
@@ -1511,46 +1511,46 @@
           <a:lstStyle>
             <a:lvl1pPr marL="0" indent="0">
               <a:buNone/>
-              <a:defRPr sz="1800" b="1"/>
+              <a:defRPr sz="1772" b="1"/>
             </a:lvl1pPr>
-            <a:lvl2pPr marL="342900" indent="0">
-              <a:buNone/>
-              <a:defRPr sz="1500" b="1"/>
+            <a:lvl2pPr marL="337551" indent="0">
+              <a:buNone/>
+              <a:defRPr sz="1477" b="1"/>
             </a:lvl2pPr>
-            <a:lvl3pPr marL="685800" indent="0">
-              <a:buNone/>
-              <a:defRPr sz="1350" b="1"/>
+            <a:lvl3pPr marL="675102" indent="0">
+              <a:buNone/>
+              <a:defRPr sz="1329" b="1"/>
             </a:lvl3pPr>
-            <a:lvl4pPr marL="1028700" indent="0">
-              <a:buNone/>
-              <a:defRPr sz="1200" b="1"/>
+            <a:lvl4pPr marL="1012652" indent="0">
+              <a:buNone/>
+              <a:defRPr sz="1181" b="1"/>
             </a:lvl4pPr>
-            <a:lvl5pPr marL="1371600" indent="0">
-              <a:buNone/>
-              <a:defRPr sz="1200" b="1"/>
+            <a:lvl5pPr marL="1350203" indent="0">
+              <a:buNone/>
+              <a:defRPr sz="1181" b="1"/>
             </a:lvl5pPr>
-            <a:lvl6pPr marL="1714500" indent="0">
-              <a:buNone/>
-              <a:defRPr sz="1200" b="1"/>
+            <a:lvl6pPr marL="1687754" indent="0">
+              <a:buNone/>
+              <a:defRPr sz="1181" b="1"/>
             </a:lvl6pPr>
-            <a:lvl7pPr marL="2057400" indent="0">
-              <a:buNone/>
-              <a:defRPr sz="1200" b="1"/>
+            <a:lvl7pPr marL="2025305" indent="0">
+              <a:buNone/>
+              <a:defRPr sz="1181" b="1"/>
             </a:lvl7pPr>
-            <a:lvl8pPr marL="2400300" indent="0">
-              <a:buNone/>
-              <a:defRPr sz="1200" b="1"/>
+            <a:lvl8pPr marL="2362855" indent="0">
+              <a:buNone/>
+              <a:defRPr sz="1181" b="1"/>
             </a:lvl8pPr>
-            <a:lvl9pPr marL="2743200" indent="0">
-              <a:buNone/>
-              <a:defRPr sz="1200" b="1"/>
+            <a:lvl9pPr marL="2700406" indent="0">
+              <a:buNone/>
+              <a:defRPr sz="1181" b="1"/>
             </a:lvl9pPr>
           </a:lstStyle>
           <a:p>
             <a:pPr lvl="0"/>
             <a:r>
-              <a:rPr lang="de-DE" smtClean="0"/>
-              <a:t>Textmasterformat bearbeiten</a:t>
+              <a:rPr lang="en-US"/>
+              <a:t>Click to edit Master text styles</a:t>
             </a:r>
           </a:p>
         </p:txBody>
@@ -1567,8 +1567,8 @@
         </p:nvSpPr>
         <p:spPr>
           <a:xfrm>
-            <a:off x="4556827" y="1709484"/>
-            <a:ext cx="3826651" cy="2514390"/>
+            <a:off x="4556819" y="2038273"/>
+            <a:ext cx="3826651" cy="2997993"/>
           </a:xfrm>
         </p:spPr>
         <p:txBody>
@@ -1577,36 +1577,36 @@
           <a:p>
             <a:pPr lvl="0"/>
             <a:r>
-              <a:rPr lang="de-DE" smtClean="0"/>
-              <a:t>Textmasterformat bearbeiten</a:t>
+              <a:rPr lang="en-US"/>
+              <a:t>Click to edit Master text styles</a:t>
             </a:r>
           </a:p>
           <a:p>
             <a:pPr lvl="1"/>
             <a:r>
-              <a:rPr lang="de-DE" smtClean="0"/>
-              <a:t>Zweite Ebene</a:t>
+              <a:rPr lang="en-US"/>
+              <a:t>Second level</a:t>
             </a:r>
           </a:p>
           <a:p>
             <a:pPr lvl="2"/>
             <a:r>
-              <a:rPr lang="de-DE" smtClean="0"/>
-              <a:t>Dritte Ebene</a:t>
+              <a:rPr lang="en-US"/>
+              <a:t>Third level</a:t>
             </a:r>
           </a:p>
           <a:p>
             <a:pPr lvl="3"/>
             <a:r>
-              <a:rPr lang="de-DE" smtClean="0"/>
-              <a:t>Vierte Ebene</a:t>
+              <a:rPr lang="en-US"/>
+              <a:t>Fourth level</a:t>
             </a:r>
           </a:p>
           <a:p>
             <a:pPr lvl="4"/>
             <a:r>
-              <a:rPr lang="de-DE" smtClean="0"/>
-              <a:t>Fünfte Ebene</a:t>
+              <a:rPr lang="en-US"/>
+              <a:t>Fifth level</a:t>
             </a:r>
             <a:endParaRPr lang="en-US" dirty="0"/>
           </a:p>
@@ -1629,7 +1629,7 @@
           <a:p>
             <a:fld id="{300DB245-849F-4AAA-AD3E-676A6FA9CB3B}" type="datetimeFigureOut">
               <a:rPr lang="de-DE" smtClean="0"/>
-              <a:t>09.06.2017</a:t>
+              <a:t>07.04.2019</a:t>
             </a:fld>
             <a:endParaRPr lang="de-DE"/>
           </a:p>
@@ -1671,7 +1671,7 @@
           <a:p>
             <a:fld id="{09B3A486-8BC0-4F15-8591-77BE555F5E45}" type="slidenum">
               <a:rPr lang="de-DE" smtClean="0"/>
-              <a:t>‹Nr.›</a:t>
+              <a:t>‹#›</a:t>
             </a:fld>
             <a:endParaRPr lang="de-DE"/>
           </a:p>
@@ -1680,7 +1680,7 @@
     </p:spTree>
     <p:extLst>
       <p:ext uri="{BB962C8B-B14F-4D97-AF65-F5344CB8AC3E}">
-        <p14:creationId xmlns:p14="http://schemas.microsoft.com/office/powerpoint/2010/main" val="3431123680"/>
+        <p14:creationId xmlns:p14="http://schemas.microsoft.com/office/powerpoint/2010/main" val="3794144586"/>
       </p:ext>
     </p:extLst>
   </p:cSld>
@@ -1692,7 +1692,7 @@
 
 <file path=ppt/slideLayouts/slideLayout6.xml><?xml version="1.0" encoding="utf-8"?>
 <p:sldLayout xmlns:a="http://schemas.openxmlformats.org/drawingml/2006/main" xmlns:r="http://schemas.openxmlformats.org/officeDocument/2006/relationships" xmlns:p="http://schemas.openxmlformats.org/presentationml/2006/main" type="titleOnly" preserve="1">
-  <p:cSld name="Nur Titel">
+  <p:cSld name="Title Only">
     <p:spTree>
       <p:nvGrpSpPr>
         <p:cNvPr id="1" name=""/>
@@ -1723,8 +1723,8 @@
           <a:lstStyle/>
           <a:p>
             <a:r>
-              <a:rPr lang="de-DE" smtClean="0"/>
-              <a:t>Titelmasterformat durch Klicken bearbeiten</a:t>
+              <a:rPr lang="en-US"/>
+              <a:t>Click to edit Master title style</a:t>
             </a:r>
             <a:endParaRPr lang="en-US" dirty="0"/>
           </a:p>
@@ -1747,7 +1747,7 @@
           <a:p>
             <a:fld id="{300DB245-849F-4AAA-AD3E-676A6FA9CB3B}" type="datetimeFigureOut">
               <a:rPr lang="de-DE" smtClean="0"/>
-              <a:t>09.06.2017</a:t>
+              <a:t>07.04.2019</a:t>
             </a:fld>
             <a:endParaRPr lang="de-DE"/>
           </a:p>
@@ -1789,7 +1789,7 @@
           <a:p>
             <a:fld id="{09B3A486-8BC0-4F15-8591-77BE555F5E45}" type="slidenum">
               <a:rPr lang="de-DE" smtClean="0"/>
-              <a:t>‹Nr.›</a:t>
+              <a:t>‹#›</a:t>
             </a:fld>
             <a:endParaRPr lang="de-DE"/>
           </a:p>
@@ -1798,7 +1798,7 @@
     </p:spTree>
     <p:extLst>
       <p:ext uri="{BB962C8B-B14F-4D97-AF65-F5344CB8AC3E}">
-        <p14:creationId xmlns:p14="http://schemas.microsoft.com/office/powerpoint/2010/main" val="104264499"/>
+        <p14:creationId xmlns:p14="http://schemas.microsoft.com/office/powerpoint/2010/main" val="2571751969"/>
       </p:ext>
     </p:extLst>
   </p:cSld>
@@ -1810,7 +1810,7 @@
 
 <file path=ppt/slideLayouts/slideLayout7.xml><?xml version="1.0" encoding="utf-8"?>
 <p:sldLayout xmlns:a="http://schemas.openxmlformats.org/drawingml/2006/main" xmlns:r="http://schemas.openxmlformats.org/officeDocument/2006/relationships" xmlns:p="http://schemas.openxmlformats.org/presentationml/2006/main" type="blank" preserve="1">
-  <p:cSld name="Leer">
+  <p:cSld name="Blank">
     <p:spTree>
       <p:nvGrpSpPr>
         <p:cNvPr id="1" name=""/>
@@ -1842,7 +1842,7 @@
           <a:p>
             <a:fld id="{300DB245-849F-4AAA-AD3E-676A6FA9CB3B}" type="datetimeFigureOut">
               <a:rPr lang="de-DE" smtClean="0"/>
-              <a:t>09.06.2017</a:t>
+              <a:t>07.04.2019</a:t>
             </a:fld>
             <a:endParaRPr lang="de-DE"/>
           </a:p>
@@ -1884,7 +1884,7 @@
           <a:p>
             <a:fld id="{09B3A486-8BC0-4F15-8591-77BE555F5E45}" type="slidenum">
               <a:rPr lang="de-DE" smtClean="0"/>
-              <a:t>‹Nr.›</a:t>
+              <a:t>‹#›</a:t>
             </a:fld>
             <a:endParaRPr lang="de-DE"/>
           </a:p>
@@ -1893,7 +1893,7 @@
     </p:spTree>
     <p:extLst>
       <p:ext uri="{BB962C8B-B14F-4D97-AF65-F5344CB8AC3E}">
-        <p14:creationId xmlns:p14="http://schemas.microsoft.com/office/powerpoint/2010/main" val="53626979"/>
+        <p14:creationId xmlns:p14="http://schemas.microsoft.com/office/powerpoint/2010/main" val="2461501354"/>
       </p:ext>
     </p:extLst>
   </p:cSld>
@@ -1905,7 +1905,7 @@
 
 <file path=ppt/slideLayouts/slideLayout8.xml><?xml version="1.0" encoding="utf-8"?>
 <p:sldLayout xmlns:a="http://schemas.openxmlformats.org/drawingml/2006/main" xmlns:r="http://schemas.openxmlformats.org/officeDocument/2006/relationships" xmlns:p="http://schemas.openxmlformats.org/presentationml/2006/main" type="objTx" preserve="1">
-  <p:cSld name="Inhalt mit Überschrift">
+  <p:cSld name="Content with Caption">
     <p:spTree>
       <p:nvGrpSpPr>
         <p:cNvPr id="1" name=""/>
@@ -1932,21 +1932,21 @@
         </p:nvSpPr>
         <p:spPr>
           <a:xfrm>
-            <a:off x="620000" y="311999"/>
-            <a:ext cx="2903097" cy="1091989"/>
+            <a:off x="620000" y="372004"/>
+            <a:ext cx="2903097" cy="1302015"/>
           </a:xfrm>
         </p:spPr>
         <p:txBody>
           <a:bodyPr anchor="b"/>
           <a:lstStyle>
             <a:lvl1pPr>
-              <a:defRPr sz="2400"/>
+              <a:defRPr sz="2363"/>
             </a:lvl1pPr>
           </a:lstStyle>
           <a:p>
             <a:r>
-              <a:rPr lang="de-DE" smtClean="0"/>
-              <a:t>Titelmasterformat durch Klicken bearbeiten</a:t>
+              <a:rPr lang="en-US"/>
+              <a:t>Click to edit Master title style</a:t>
             </a:r>
             <a:endParaRPr lang="en-US" dirty="0"/>
           </a:p>
@@ -1964,74 +1964,74 @@
         </p:nvSpPr>
         <p:spPr>
           <a:xfrm>
-            <a:off x="3826650" y="673829"/>
-            <a:ext cx="4556820" cy="3325798"/>
+            <a:off x="3826650" y="803426"/>
+            <a:ext cx="4556820" cy="3965461"/>
           </a:xfrm>
         </p:spPr>
         <p:txBody>
           <a:bodyPr/>
           <a:lstStyle>
             <a:lvl1pPr>
-              <a:defRPr sz="2400"/>
+              <a:defRPr sz="2363"/>
             </a:lvl1pPr>
             <a:lvl2pPr>
-              <a:defRPr sz="2100"/>
+              <a:defRPr sz="2067"/>
             </a:lvl2pPr>
             <a:lvl3pPr>
-              <a:defRPr sz="1800"/>
+              <a:defRPr sz="1772"/>
             </a:lvl3pPr>
             <a:lvl4pPr>
-              <a:defRPr sz="1500"/>
+              <a:defRPr sz="1477"/>
             </a:lvl4pPr>
             <a:lvl5pPr>
-              <a:defRPr sz="1500"/>
+              <a:defRPr sz="1477"/>
             </a:lvl5pPr>
             <a:lvl6pPr>
-              <a:defRPr sz="1500"/>
+              <a:defRPr sz="1477"/>
             </a:lvl6pPr>
             <a:lvl7pPr>
-              <a:defRPr sz="1500"/>
+              <a:defRPr sz="1477"/>
             </a:lvl7pPr>
             <a:lvl8pPr>
-              <a:defRPr sz="1500"/>
+              <a:defRPr sz="1477"/>
             </a:lvl8pPr>
             <a:lvl9pPr>
-              <a:defRPr sz="1500"/>
+              <a:defRPr sz="1477"/>
             </a:lvl9pPr>
           </a:lstStyle>
           <a:p>
             <a:pPr lvl="0"/>
             <a:r>
-              <a:rPr lang="de-DE" smtClean="0"/>
-              <a:t>Textmasterformat bearbeiten</a:t>
+              <a:rPr lang="en-US"/>
+              <a:t>Click to edit Master text styles</a:t>
             </a:r>
           </a:p>
           <a:p>
             <a:pPr lvl="1"/>
             <a:r>
-              <a:rPr lang="de-DE" smtClean="0"/>
-              <a:t>Zweite Ebene</a:t>
+              <a:rPr lang="en-US"/>
+              <a:t>Second level</a:t>
             </a:r>
           </a:p>
           <a:p>
             <a:pPr lvl="2"/>
             <a:r>
-              <a:rPr lang="de-DE" smtClean="0"/>
-              <a:t>Dritte Ebene</a:t>
+              <a:rPr lang="en-US"/>
+              <a:t>Third level</a:t>
             </a:r>
           </a:p>
           <a:p>
             <a:pPr lvl="3"/>
             <a:r>
-              <a:rPr lang="de-DE" smtClean="0"/>
-              <a:t>Vierte Ebene</a:t>
+              <a:rPr lang="en-US"/>
+              <a:t>Fourth level</a:t>
             </a:r>
           </a:p>
           <a:p>
             <a:pPr lvl="4"/>
             <a:r>
-              <a:rPr lang="de-DE" smtClean="0"/>
-              <a:t>Fünfte Ebene</a:t>
+              <a:rPr lang="en-US"/>
+              <a:t>Fifth level</a:t>
             </a:r>
             <a:endParaRPr lang="en-US" dirty="0"/>
           </a:p>
@@ -2049,8 +2049,8 @@
         </p:nvSpPr>
         <p:spPr>
           <a:xfrm>
-            <a:off x="620000" y="1403989"/>
-            <a:ext cx="2903097" cy="2601054"/>
+            <a:off x="620000" y="1674019"/>
+            <a:ext cx="2903097" cy="3101327"/>
           </a:xfrm>
         </p:spPr>
         <p:txBody>
@@ -2058,46 +2058,46 @@
           <a:lstStyle>
             <a:lvl1pPr marL="0" indent="0">
               <a:buNone/>
-              <a:defRPr sz="1200"/>
+              <a:defRPr sz="1181"/>
             </a:lvl1pPr>
-            <a:lvl2pPr marL="342900" indent="0">
-              <a:buNone/>
-              <a:defRPr sz="1050"/>
+            <a:lvl2pPr marL="337551" indent="0">
+              <a:buNone/>
+              <a:defRPr sz="1034"/>
             </a:lvl2pPr>
-            <a:lvl3pPr marL="685800" indent="0">
-              <a:buNone/>
-              <a:defRPr sz="900"/>
+            <a:lvl3pPr marL="675102" indent="0">
+              <a:buNone/>
+              <a:defRPr sz="886"/>
             </a:lvl3pPr>
-            <a:lvl4pPr marL="1028700" indent="0">
-              <a:buNone/>
-              <a:defRPr sz="750"/>
+            <a:lvl4pPr marL="1012652" indent="0">
+              <a:buNone/>
+              <a:defRPr sz="738"/>
             </a:lvl4pPr>
-            <a:lvl5pPr marL="1371600" indent="0">
-              <a:buNone/>
-              <a:defRPr sz="750"/>
+            <a:lvl5pPr marL="1350203" indent="0">
+              <a:buNone/>
+              <a:defRPr sz="738"/>
             </a:lvl5pPr>
-            <a:lvl6pPr marL="1714500" indent="0">
-              <a:buNone/>
-              <a:defRPr sz="750"/>
+            <a:lvl6pPr marL="1687754" indent="0">
+              <a:buNone/>
+              <a:defRPr sz="738"/>
             </a:lvl6pPr>
-            <a:lvl7pPr marL="2057400" indent="0">
-              <a:buNone/>
-              <a:defRPr sz="750"/>
+            <a:lvl7pPr marL="2025305" indent="0">
+              <a:buNone/>
+              <a:defRPr sz="738"/>
             </a:lvl7pPr>
-            <a:lvl8pPr marL="2400300" indent="0">
-              <a:buNone/>
-              <a:defRPr sz="750"/>
+            <a:lvl8pPr marL="2362855" indent="0">
+              <a:buNone/>
+              <a:defRPr sz="738"/>
             </a:lvl8pPr>
-            <a:lvl9pPr marL="2743200" indent="0">
-              <a:buNone/>
-              <a:defRPr sz="750"/>
+            <a:lvl9pPr marL="2700406" indent="0">
+              <a:buNone/>
+              <a:defRPr sz="738"/>
             </a:lvl9pPr>
           </a:lstStyle>
           <a:p>
             <a:pPr lvl="0"/>
             <a:r>
-              <a:rPr lang="de-DE" smtClean="0"/>
-              <a:t>Textmasterformat bearbeiten</a:t>
+              <a:rPr lang="en-US"/>
+              <a:t>Click to edit Master text styles</a:t>
             </a:r>
           </a:p>
         </p:txBody>
@@ -2119,7 +2119,7 @@
           <a:p>
             <a:fld id="{300DB245-849F-4AAA-AD3E-676A6FA9CB3B}" type="datetimeFigureOut">
               <a:rPr lang="de-DE" smtClean="0"/>
-              <a:t>09.06.2017</a:t>
+              <a:t>07.04.2019</a:t>
             </a:fld>
             <a:endParaRPr lang="de-DE"/>
           </a:p>
@@ -2161,7 +2161,7 @@
           <a:p>
             <a:fld id="{09B3A486-8BC0-4F15-8591-77BE555F5E45}" type="slidenum">
               <a:rPr lang="de-DE" smtClean="0"/>
-              <a:t>‹Nr.›</a:t>
+              <a:t>‹#›</a:t>
             </a:fld>
             <a:endParaRPr lang="de-DE"/>
           </a:p>
@@ -2170,7 +2170,7 @@
     </p:spTree>
     <p:extLst>
       <p:ext uri="{BB962C8B-B14F-4D97-AF65-F5344CB8AC3E}">
-        <p14:creationId xmlns:p14="http://schemas.microsoft.com/office/powerpoint/2010/main" val="2340301086"/>
+        <p14:creationId xmlns:p14="http://schemas.microsoft.com/office/powerpoint/2010/main" val="3827214540"/>
       </p:ext>
     </p:extLst>
   </p:cSld>
@@ -2182,7 +2182,7 @@
 
 <file path=ppt/slideLayouts/slideLayout9.xml><?xml version="1.0" encoding="utf-8"?>
 <p:sldLayout xmlns:a="http://schemas.openxmlformats.org/drawingml/2006/main" xmlns:r="http://schemas.openxmlformats.org/officeDocument/2006/relationships" xmlns:p="http://schemas.openxmlformats.org/presentationml/2006/main" type="picTx" preserve="1">
-  <p:cSld name="Bild mit Überschrift">
+  <p:cSld name="Picture with Caption">
     <p:spTree>
       <p:nvGrpSpPr>
         <p:cNvPr id="1" name=""/>
@@ -2209,21 +2209,21 @@
         </p:nvSpPr>
         <p:spPr>
           <a:xfrm>
-            <a:off x="620000" y="311999"/>
-            <a:ext cx="2903097" cy="1091989"/>
+            <a:off x="620000" y="372004"/>
+            <a:ext cx="2903097" cy="1302015"/>
           </a:xfrm>
         </p:spPr>
         <p:txBody>
           <a:bodyPr anchor="b"/>
           <a:lstStyle>
             <a:lvl1pPr>
-              <a:defRPr sz="2400"/>
+              <a:defRPr sz="2363"/>
             </a:lvl1pPr>
           </a:lstStyle>
           <a:p>
             <a:r>
-              <a:rPr lang="de-DE" smtClean="0"/>
-              <a:t>Titelmasterformat durch Klicken bearbeiten</a:t>
+              <a:rPr lang="en-US"/>
+              <a:t>Click to edit Master title style</a:t>
             </a:r>
             <a:endParaRPr lang="en-US" dirty="0"/>
           </a:p>
@@ -2241,8 +2241,8 @@
         </p:nvSpPr>
         <p:spPr>
           <a:xfrm>
-            <a:off x="3826650" y="673829"/>
-            <a:ext cx="4556820" cy="3325798"/>
+            <a:off x="3826650" y="803426"/>
+            <a:ext cx="4556820" cy="3965461"/>
           </a:xfrm>
         </p:spPr>
         <p:txBody>
@@ -2250,47 +2250,46 @@
           <a:lstStyle>
             <a:lvl1pPr marL="0" indent="0">
               <a:buNone/>
-              <a:defRPr sz="2400"/>
+              <a:defRPr sz="2363"/>
             </a:lvl1pPr>
-            <a:lvl2pPr marL="342900" indent="0">
-              <a:buNone/>
-              <a:defRPr sz="2100"/>
+            <a:lvl2pPr marL="337551" indent="0">
+              <a:buNone/>
+              <a:defRPr sz="2067"/>
             </a:lvl2pPr>
-            <a:lvl3pPr marL="685800" indent="0">
-              <a:buNone/>
-              <a:defRPr sz="1800"/>
+            <a:lvl3pPr marL="675102" indent="0">
+              <a:buNone/>
+              <a:defRPr sz="1772"/>
             </a:lvl3pPr>
-            <a:lvl4pPr marL="1028700" indent="0">
-              <a:buNone/>
-              <a:defRPr sz="1500"/>
+            <a:lvl4pPr marL="1012652" indent="0">
+              <a:buNone/>
+              <a:defRPr sz="1477"/>
             </a:lvl4pPr>
-            <a:lvl5pPr marL="1371600" indent="0">
-              <a:buNone/>
-              <a:defRPr sz="1500"/>
+            <a:lvl5pPr marL="1350203" indent="0">
+              <a:buNone/>
+              <a:defRPr sz="1477"/>
             </a:lvl5pPr>
-            <a:lvl6pPr marL="1714500" indent="0">
-              <a:buNone/>
-              <a:defRPr sz="1500"/>
+            <a:lvl6pPr marL="1687754" indent="0">
+              <a:buNone/>
+              <a:defRPr sz="1477"/>
             </a:lvl6pPr>
-            <a:lvl7pPr marL="2057400" indent="0">
-              <a:buNone/>
-              <a:defRPr sz="1500"/>
+            <a:lvl7pPr marL="2025305" indent="0">
+              <a:buNone/>
+              <a:defRPr sz="1477"/>
             </a:lvl7pPr>
-            <a:lvl8pPr marL="2400300" indent="0">
-              <a:buNone/>
-              <a:defRPr sz="1500"/>
+            <a:lvl8pPr marL="2362855" indent="0">
+              <a:buNone/>
+              <a:defRPr sz="1477"/>
             </a:lvl8pPr>
-            <a:lvl9pPr marL="2743200" indent="0">
-              <a:buNone/>
-              <a:defRPr sz="1500"/>
+            <a:lvl9pPr marL="2700406" indent="0">
+              <a:buNone/>
+              <a:defRPr sz="1477"/>
             </a:lvl9pPr>
           </a:lstStyle>
           <a:p>
             <a:r>
-              <a:rPr lang="de-DE" smtClean="0"/>
-              <a:t>Bild durch Klicken auf Symbol hinzufügen</a:t>
-            </a:r>
-            <a:endParaRPr lang="en-US" dirty="0"/>
+              <a:rPr lang="en-US"/>
+              <a:t>Click icon to add picture</a:t>
+            </a:r>
           </a:p>
         </p:txBody>
       </p:sp>
@@ -2306,8 +2305,8 @@
         </p:nvSpPr>
         <p:spPr>
           <a:xfrm>
-            <a:off x="620000" y="1403989"/>
-            <a:ext cx="2903097" cy="2601054"/>
+            <a:off x="620000" y="1674019"/>
+            <a:ext cx="2903097" cy="3101327"/>
           </a:xfrm>
         </p:spPr>
         <p:txBody>
@@ -2315,46 +2314,46 @@
           <a:lstStyle>
             <a:lvl1pPr marL="0" indent="0">
               <a:buNone/>
-              <a:defRPr sz="1200"/>
+              <a:defRPr sz="1181"/>
             </a:lvl1pPr>
-            <a:lvl2pPr marL="342900" indent="0">
-              <a:buNone/>
-              <a:defRPr sz="1050"/>
+            <a:lvl2pPr marL="337551" indent="0">
+              <a:buNone/>
+              <a:defRPr sz="1034"/>
             </a:lvl2pPr>
-            <a:lvl3pPr marL="685800" indent="0">
-              <a:buNone/>
-              <a:defRPr sz="900"/>
+            <a:lvl3pPr marL="675102" indent="0">
+              <a:buNone/>
+              <a:defRPr sz="886"/>
             </a:lvl3pPr>
-            <a:lvl4pPr marL="1028700" indent="0">
-              <a:buNone/>
-              <a:defRPr sz="750"/>
+            <a:lvl4pPr marL="1012652" indent="0">
+              <a:buNone/>
+              <a:defRPr sz="738"/>
             </a:lvl4pPr>
-            <a:lvl5pPr marL="1371600" indent="0">
-              <a:buNone/>
-              <a:defRPr sz="750"/>
+            <a:lvl5pPr marL="1350203" indent="0">
+              <a:buNone/>
+              <a:defRPr sz="738"/>
             </a:lvl5pPr>
-            <a:lvl6pPr marL="1714500" indent="0">
-              <a:buNone/>
-              <a:defRPr sz="750"/>
+            <a:lvl6pPr marL="1687754" indent="0">
+              <a:buNone/>
+              <a:defRPr sz="738"/>
             </a:lvl6pPr>
-            <a:lvl7pPr marL="2057400" indent="0">
-              <a:buNone/>
-              <a:defRPr sz="750"/>
+            <a:lvl7pPr marL="2025305" indent="0">
+              <a:buNone/>
+              <a:defRPr sz="738"/>
             </a:lvl7pPr>
-            <a:lvl8pPr marL="2400300" indent="0">
-              <a:buNone/>
-              <a:defRPr sz="750"/>
+            <a:lvl8pPr marL="2362855" indent="0">
+              <a:buNone/>
+              <a:defRPr sz="738"/>
             </a:lvl8pPr>
-            <a:lvl9pPr marL="2743200" indent="0">
-              <a:buNone/>
-              <a:defRPr sz="750"/>
+            <a:lvl9pPr marL="2700406" indent="0">
+              <a:buNone/>
+              <a:defRPr sz="738"/>
             </a:lvl9pPr>
           </a:lstStyle>
           <a:p>
             <a:pPr lvl="0"/>
             <a:r>
-              <a:rPr lang="de-DE" smtClean="0"/>
-              <a:t>Textmasterformat bearbeiten</a:t>
+              <a:rPr lang="en-US"/>
+              <a:t>Click to edit Master text styles</a:t>
             </a:r>
           </a:p>
         </p:txBody>
@@ -2376,7 +2375,7 @@
           <a:p>
             <a:fld id="{300DB245-849F-4AAA-AD3E-676A6FA9CB3B}" type="datetimeFigureOut">
               <a:rPr lang="de-DE" smtClean="0"/>
-              <a:t>09.06.2017</a:t>
+              <a:t>07.04.2019</a:t>
             </a:fld>
             <a:endParaRPr lang="de-DE"/>
           </a:p>
@@ -2418,7 +2417,7 @@
           <a:p>
             <a:fld id="{09B3A486-8BC0-4F15-8591-77BE555F5E45}" type="slidenum">
               <a:rPr lang="de-DE" smtClean="0"/>
-              <a:t>‹Nr.›</a:t>
+              <a:t>‹#›</a:t>
             </a:fld>
             <a:endParaRPr lang="de-DE"/>
           </a:p>
@@ -2427,7 +2426,7 @@
     </p:spTree>
     <p:extLst>
       <p:ext uri="{BB962C8B-B14F-4D97-AF65-F5344CB8AC3E}">
-        <p14:creationId xmlns:p14="http://schemas.microsoft.com/office/powerpoint/2010/main" val="2231719259"/>
+        <p14:creationId xmlns:p14="http://schemas.microsoft.com/office/powerpoint/2010/main" val="3146129798"/>
       </p:ext>
     </p:extLst>
   </p:cSld>
@@ -2471,8 +2470,8 @@
         </p:nvSpPr>
         <p:spPr>
           <a:xfrm>
-            <a:off x="618828" y="249166"/>
-            <a:ext cx="7763470" cy="904574"/>
+            <a:off x="618828" y="297087"/>
+            <a:ext cx="7763470" cy="1078554"/>
           </a:xfrm>
           <a:prstGeom prst="rect">
             <a:avLst/>
@@ -2485,8 +2484,8 @@
           <a:lstStyle/>
           <a:p>
             <a:r>
-              <a:rPr lang="de-DE" smtClean="0"/>
-              <a:t>Titelmasterformat durch Klicken bearbeiten</a:t>
+              <a:rPr lang="en-US"/>
+              <a:t>Click to edit Master title style</a:t>
             </a:r>
             <a:endParaRPr lang="en-US" dirty="0"/>
           </a:p>
@@ -2504,8 +2503,8 @@
         </p:nvSpPr>
         <p:spPr>
           <a:xfrm>
-            <a:off x="618828" y="1245825"/>
-            <a:ext cx="7763470" cy="2969386"/>
+            <a:off x="618828" y="1485433"/>
+            <a:ext cx="7763470" cy="3540499"/>
           </a:xfrm>
           <a:prstGeom prst="rect">
             <a:avLst/>
@@ -2519,36 +2518,36 @@
           <a:p>
             <a:pPr lvl="0"/>
             <a:r>
-              <a:rPr lang="de-DE" smtClean="0"/>
-              <a:t>Textmasterformat bearbeiten</a:t>
+              <a:rPr lang="en-US"/>
+              <a:t>Click to edit Master text styles</a:t>
             </a:r>
           </a:p>
           <a:p>
             <a:pPr lvl="1"/>
             <a:r>
-              <a:rPr lang="de-DE" smtClean="0"/>
-              <a:t>Zweite Ebene</a:t>
+              <a:rPr lang="en-US"/>
+              <a:t>Second level</a:t>
             </a:r>
           </a:p>
           <a:p>
             <a:pPr lvl="2"/>
             <a:r>
-              <a:rPr lang="de-DE" smtClean="0"/>
-              <a:t>Dritte Ebene</a:t>
+              <a:rPr lang="en-US"/>
+              <a:t>Third level</a:t>
             </a:r>
           </a:p>
           <a:p>
             <a:pPr lvl="3"/>
             <a:r>
-              <a:rPr lang="de-DE" smtClean="0"/>
-              <a:t>Vierte Ebene</a:t>
+              <a:rPr lang="en-US"/>
+              <a:t>Fourth level</a:t>
             </a:r>
           </a:p>
           <a:p>
             <a:pPr lvl="4"/>
             <a:r>
-              <a:rPr lang="de-DE" smtClean="0"/>
-              <a:t>Fünfte Ebene</a:t>
+              <a:rPr lang="en-US"/>
+              <a:t>Fifth level</a:t>
             </a:r>
             <a:endParaRPr lang="en-US" dirty="0"/>
           </a:p>
@@ -2566,8 +2565,8 @@
         </p:nvSpPr>
         <p:spPr>
           <a:xfrm>
-            <a:off x="618827" y="4337624"/>
-            <a:ext cx="2025253" cy="249164"/>
+            <a:off x="618827" y="5171892"/>
+            <a:ext cx="2025253" cy="297087"/>
           </a:xfrm>
           <a:prstGeom prst="rect">
             <a:avLst/>
@@ -2577,7 +2576,7 @@
           <a:bodyPr vert="horz" lIns="91440" tIns="45720" rIns="91440" bIns="45720" rtlCol="0" anchor="ctr"/>
           <a:lstStyle>
             <a:lvl1pPr algn="l">
-              <a:defRPr sz="900">
+              <a:defRPr sz="886">
                 <a:solidFill>
                   <a:schemeClr val="tx1">
                     <a:tint val="75000"/>
@@ -2589,7 +2588,7 @@
           <a:p>
             <a:fld id="{300DB245-849F-4AAA-AD3E-676A6FA9CB3B}" type="datetimeFigureOut">
               <a:rPr lang="de-DE" smtClean="0"/>
-              <a:t>09.06.2017</a:t>
+              <a:t>07.04.2019</a:t>
             </a:fld>
             <a:endParaRPr lang="de-DE"/>
           </a:p>
@@ -2607,8 +2606,8 @@
         </p:nvSpPr>
         <p:spPr>
           <a:xfrm>
-            <a:off x="2981623" y="4337624"/>
-            <a:ext cx="3037880" cy="249164"/>
+            <a:off x="2981623" y="5171892"/>
+            <a:ext cx="3037880" cy="297087"/>
           </a:xfrm>
           <a:prstGeom prst="rect">
             <a:avLst/>
@@ -2618,7 +2617,7 @@
           <a:bodyPr vert="horz" lIns="91440" tIns="45720" rIns="91440" bIns="45720" rtlCol="0" anchor="ctr"/>
           <a:lstStyle>
             <a:lvl1pPr algn="ctr">
-              <a:defRPr sz="900">
+              <a:defRPr sz="886">
                 <a:solidFill>
                   <a:schemeClr val="tx1">
                     <a:tint val="75000"/>
@@ -2644,8 +2643,8 @@
         </p:nvSpPr>
         <p:spPr>
           <a:xfrm>
-            <a:off x="6357045" y="4337624"/>
-            <a:ext cx="2025253" cy="249164"/>
+            <a:off x="6357045" y="5171892"/>
+            <a:ext cx="2025253" cy="297087"/>
           </a:xfrm>
           <a:prstGeom prst="rect">
             <a:avLst/>
@@ -2655,7 +2654,7 @@
           <a:bodyPr vert="horz" lIns="91440" tIns="45720" rIns="91440" bIns="45720" rtlCol="0" anchor="ctr"/>
           <a:lstStyle>
             <a:lvl1pPr algn="r">
-              <a:defRPr sz="900">
+              <a:defRPr sz="886">
                 <a:solidFill>
                   <a:schemeClr val="tx1">
                     <a:tint val="75000"/>
@@ -2667,7 +2666,7 @@
           <a:p>
             <a:fld id="{09B3A486-8BC0-4F15-8591-77BE555F5E45}" type="slidenum">
               <a:rPr lang="de-DE" smtClean="0"/>
-              <a:t>‹Nr.›</a:t>
+              <a:t>‹#›</a:t>
             </a:fld>
             <a:endParaRPr lang="de-DE"/>
           </a:p>
@@ -2676,27 +2675,27 @@
     </p:spTree>
     <p:extLst>
       <p:ext uri="{BB962C8B-B14F-4D97-AF65-F5344CB8AC3E}">
-        <p14:creationId xmlns:p14="http://schemas.microsoft.com/office/powerpoint/2010/main" val="155316202"/>
+        <p14:creationId xmlns:p14="http://schemas.microsoft.com/office/powerpoint/2010/main" val="2942902905"/>
       </p:ext>
     </p:extLst>
   </p:cSld>
   <p:clrMap bg1="lt1" tx1="dk1" bg2="lt2" tx2="dk2" accent1="accent1" accent2="accent2" accent3="accent3" accent4="accent4" accent5="accent5" accent6="accent6" hlink="hlink" folHlink="folHlink"/>
   <p:sldLayoutIdLst>
-    <p:sldLayoutId id="2147483697" r:id="rId1"/>
-    <p:sldLayoutId id="2147483698" r:id="rId2"/>
-    <p:sldLayoutId id="2147483699" r:id="rId3"/>
-    <p:sldLayoutId id="2147483700" r:id="rId4"/>
-    <p:sldLayoutId id="2147483701" r:id="rId5"/>
-    <p:sldLayoutId id="2147483702" r:id="rId6"/>
-    <p:sldLayoutId id="2147483703" r:id="rId7"/>
-    <p:sldLayoutId id="2147483704" r:id="rId8"/>
-    <p:sldLayoutId id="2147483705" r:id="rId9"/>
-    <p:sldLayoutId id="2147483706" r:id="rId10"/>
-    <p:sldLayoutId id="2147483707" r:id="rId11"/>
+    <p:sldLayoutId id="2147483721" r:id="rId1"/>
+    <p:sldLayoutId id="2147483722" r:id="rId2"/>
+    <p:sldLayoutId id="2147483723" r:id="rId3"/>
+    <p:sldLayoutId id="2147483724" r:id="rId4"/>
+    <p:sldLayoutId id="2147483725" r:id="rId5"/>
+    <p:sldLayoutId id="2147483726" r:id="rId6"/>
+    <p:sldLayoutId id="2147483727" r:id="rId7"/>
+    <p:sldLayoutId id="2147483728" r:id="rId8"/>
+    <p:sldLayoutId id="2147483729" r:id="rId9"/>
+    <p:sldLayoutId id="2147483730" r:id="rId10"/>
+    <p:sldLayoutId id="2147483731" r:id="rId11"/>
   </p:sldLayoutIdLst>
   <p:txStyles>
     <p:titleStyle>
-      <a:lvl1pPr algn="l" defTabSz="685800" rtl="0" eaLnBrk="1" latinLnBrk="0" hangingPunct="1">
+      <a:lvl1pPr algn="l" defTabSz="675102" rtl="0" eaLnBrk="1" latinLnBrk="0" hangingPunct="1">
         <a:lnSpc>
           <a:spcPct val="90000"/>
         </a:lnSpc>
@@ -2704,7 +2703,7 @@
           <a:spcPct val="0"/>
         </a:spcBef>
         <a:buNone/>
-        <a:defRPr sz="3300" kern="1200">
+        <a:defRPr sz="3249" kern="1200">
           <a:solidFill>
             <a:schemeClr val="tx1"/>
           </a:solidFill>
@@ -2715,16 +2714,16 @@
       </a:lvl1pPr>
     </p:titleStyle>
     <p:bodyStyle>
-      <a:lvl1pPr marL="171450" indent="-171450" algn="l" defTabSz="685800" rtl="0" eaLnBrk="1" latinLnBrk="0" hangingPunct="1">
+      <a:lvl1pPr marL="168775" indent="-168775" algn="l" defTabSz="675102" rtl="0" eaLnBrk="1" latinLnBrk="0" hangingPunct="1">
         <a:lnSpc>
           <a:spcPct val="90000"/>
         </a:lnSpc>
         <a:spcBef>
-          <a:spcPts val="750"/>
+          <a:spcPts val="738"/>
         </a:spcBef>
         <a:buFont typeface="Arial" panose="020B0604020202020204" pitchFamily="34" charset="0"/>
         <a:buChar char="•"/>
-        <a:defRPr sz="2100" kern="1200">
+        <a:defRPr sz="2067" kern="1200">
           <a:solidFill>
             <a:schemeClr val="tx1"/>
           </a:solidFill>
@@ -2733,16 +2732,16 @@
           <a:cs typeface="+mn-cs"/>
         </a:defRPr>
       </a:lvl1pPr>
-      <a:lvl2pPr marL="514350" indent="-171450" algn="l" defTabSz="685800" rtl="0" eaLnBrk="1" latinLnBrk="0" hangingPunct="1">
+      <a:lvl2pPr marL="506326" indent="-168775" algn="l" defTabSz="675102" rtl="0" eaLnBrk="1" latinLnBrk="0" hangingPunct="1">
         <a:lnSpc>
           <a:spcPct val="90000"/>
         </a:lnSpc>
         <a:spcBef>
-          <a:spcPts val="375"/>
+          <a:spcPts val="369"/>
         </a:spcBef>
         <a:buFont typeface="Arial" panose="020B0604020202020204" pitchFamily="34" charset="0"/>
         <a:buChar char="•"/>
-        <a:defRPr sz="1800" kern="1200">
+        <a:defRPr sz="1772" kern="1200">
           <a:solidFill>
             <a:schemeClr val="tx1"/>
           </a:solidFill>
@@ -2751,16 +2750,16 @@
           <a:cs typeface="+mn-cs"/>
         </a:defRPr>
       </a:lvl2pPr>
-      <a:lvl3pPr marL="857250" indent="-171450" algn="l" defTabSz="685800" rtl="0" eaLnBrk="1" latinLnBrk="0" hangingPunct="1">
+      <a:lvl3pPr marL="843877" indent="-168775" algn="l" defTabSz="675102" rtl="0" eaLnBrk="1" latinLnBrk="0" hangingPunct="1">
         <a:lnSpc>
           <a:spcPct val="90000"/>
         </a:lnSpc>
         <a:spcBef>
-          <a:spcPts val="375"/>
+          <a:spcPts val="369"/>
         </a:spcBef>
         <a:buFont typeface="Arial" panose="020B0604020202020204" pitchFamily="34" charset="0"/>
         <a:buChar char="•"/>
-        <a:defRPr sz="1500" kern="1200">
+        <a:defRPr sz="1477" kern="1200">
           <a:solidFill>
             <a:schemeClr val="tx1"/>
           </a:solidFill>
@@ -2769,16 +2768,16 @@
           <a:cs typeface="+mn-cs"/>
         </a:defRPr>
       </a:lvl3pPr>
-      <a:lvl4pPr marL="1200150" indent="-171450" algn="l" defTabSz="685800" rtl="0" eaLnBrk="1" latinLnBrk="0" hangingPunct="1">
+      <a:lvl4pPr marL="1181428" indent="-168775" algn="l" defTabSz="675102" rtl="0" eaLnBrk="1" latinLnBrk="0" hangingPunct="1">
         <a:lnSpc>
           <a:spcPct val="90000"/>
         </a:lnSpc>
         <a:spcBef>
-          <a:spcPts val="375"/>
+          <a:spcPts val="369"/>
         </a:spcBef>
         <a:buFont typeface="Arial" panose="020B0604020202020204" pitchFamily="34" charset="0"/>
         <a:buChar char="•"/>
-        <a:defRPr sz="1350" kern="1200">
+        <a:defRPr sz="1329" kern="1200">
           <a:solidFill>
             <a:schemeClr val="tx1"/>
           </a:solidFill>
@@ -2787,16 +2786,16 @@
           <a:cs typeface="+mn-cs"/>
         </a:defRPr>
       </a:lvl4pPr>
-      <a:lvl5pPr marL="1543050" indent="-171450" algn="l" defTabSz="685800" rtl="0" eaLnBrk="1" latinLnBrk="0" hangingPunct="1">
+      <a:lvl5pPr marL="1518978" indent="-168775" algn="l" defTabSz="675102" rtl="0" eaLnBrk="1" latinLnBrk="0" hangingPunct="1">
         <a:lnSpc>
           <a:spcPct val="90000"/>
         </a:lnSpc>
         <a:spcBef>
-          <a:spcPts val="375"/>
+          <a:spcPts val="369"/>
         </a:spcBef>
         <a:buFont typeface="Arial" panose="020B0604020202020204" pitchFamily="34" charset="0"/>
         <a:buChar char="•"/>
-        <a:defRPr sz="1350" kern="1200">
+        <a:defRPr sz="1329" kern="1200">
           <a:solidFill>
             <a:schemeClr val="tx1"/>
           </a:solidFill>
@@ -2805,16 +2804,16 @@
           <a:cs typeface="+mn-cs"/>
         </a:defRPr>
       </a:lvl5pPr>
-      <a:lvl6pPr marL="1885950" indent="-171450" algn="l" defTabSz="685800" rtl="0" eaLnBrk="1" latinLnBrk="0" hangingPunct="1">
+      <a:lvl6pPr marL="1856529" indent="-168775" algn="l" defTabSz="675102" rtl="0" eaLnBrk="1" latinLnBrk="0" hangingPunct="1">
         <a:lnSpc>
           <a:spcPct val="90000"/>
         </a:lnSpc>
         <a:spcBef>
-          <a:spcPts val="375"/>
+          <a:spcPts val="369"/>
         </a:spcBef>
         <a:buFont typeface="Arial" panose="020B0604020202020204" pitchFamily="34" charset="0"/>
         <a:buChar char="•"/>
-        <a:defRPr sz="1350" kern="1200">
+        <a:defRPr sz="1329" kern="1200">
           <a:solidFill>
             <a:schemeClr val="tx1"/>
           </a:solidFill>
@@ -2823,16 +2822,16 @@
           <a:cs typeface="+mn-cs"/>
         </a:defRPr>
       </a:lvl6pPr>
-      <a:lvl7pPr marL="2228850" indent="-171450" algn="l" defTabSz="685800" rtl="0" eaLnBrk="1" latinLnBrk="0" hangingPunct="1">
+      <a:lvl7pPr marL="2194080" indent="-168775" algn="l" defTabSz="675102" rtl="0" eaLnBrk="1" latinLnBrk="0" hangingPunct="1">
         <a:lnSpc>
           <a:spcPct val="90000"/>
         </a:lnSpc>
         <a:spcBef>
-          <a:spcPts val="375"/>
+          <a:spcPts val="369"/>
         </a:spcBef>
         <a:buFont typeface="Arial" panose="020B0604020202020204" pitchFamily="34" charset="0"/>
         <a:buChar char="•"/>
-        <a:defRPr sz="1350" kern="1200">
+        <a:defRPr sz="1329" kern="1200">
           <a:solidFill>
             <a:schemeClr val="tx1"/>
           </a:solidFill>
@@ -2841,16 +2840,16 @@
           <a:cs typeface="+mn-cs"/>
         </a:defRPr>
       </a:lvl7pPr>
-      <a:lvl8pPr marL="2571750" indent="-171450" algn="l" defTabSz="685800" rtl="0" eaLnBrk="1" latinLnBrk="0" hangingPunct="1">
+      <a:lvl8pPr marL="2531631" indent="-168775" algn="l" defTabSz="675102" rtl="0" eaLnBrk="1" latinLnBrk="0" hangingPunct="1">
         <a:lnSpc>
           <a:spcPct val="90000"/>
         </a:lnSpc>
         <a:spcBef>
-          <a:spcPts val="375"/>
+          <a:spcPts val="369"/>
         </a:spcBef>
         <a:buFont typeface="Arial" panose="020B0604020202020204" pitchFamily="34" charset="0"/>
         <a:buChar char="•"/>
-        <a:defRPr sz="1350" kern="1200">
+        <a:defRPr sz="1329" kern="1200">
           <a:solidFill>
             <a:schemeClr val="tx1"/>
           </a:solidFill>
@@ -2859,16 +2858,16 @@
           <a:cs typeface="+mn-cs"/>
         </a:defRPr>
       </a:lvl8pPr>
-      <a:lvl9pPr marL="2914650" indent="-171450" algn="l" defTabSz="685800" rtl="0" eaLnBrk="1" latinLnBrk="0" hangingPunct="1">
+      <a:lvl9pPr marL="2869181" indent="-168775" algn="l" defTabSz="675102" rtl="0" eaLnBrk="1" latinLnBrk="0" hangingPunct="1">
         <a:lnSpc>
           <a:spcPct val="90000"/>
         </a:lnSpc>
         <a:spcBef>
-          <a:spcPts val="375"/>
+          <a:spcPts val="369"/>
         </a:spcBef>
         <a:buFont typeface="Arial" panose="020B0604020202020204" pitchFamily="34" charset="0"/>
         <a:buChar char="•"/>
-        <a:defRPr sz="1350" kern="1200">
+        <a:defRPr sz="1329" kern="1200">
           <a:solidFill>
             <a:schemeClr val="tx1"/>
           </a:solidFill>
@@ -2882,8 +2881,8 @@
       <a:defPPr>
         <a:defRPr lang="en-US"/>
       </a:defPPr>
-      <a:lvl1pPr marL="0" algn="l" defTabSz="685800" rtl="0" eaLnBrk="1" latinLnBrk="0" hangingPunct="1">
-        <a:defRPr sz="1350" kern="1200">
+      <a:lvl1pPr marL="0" algn="l" defTabSz="675102" rtl="0" eaLnBrk="1" latinLnBrk="0" hangingPunct="1">
+        <a:defRPr sz="1329" kern="1200">
           <a:solidFill>
             <a:schemeClr val="tx1"/>
           </a:solidFill>
@@ -2892,8 +2891,8 @@
           <a:cs typeface="+mn-cs"/>
         </a:defRPr>
       </a:lvl1pPr>
-      <a:lvl2pPr marL="342900" algn="l" defTabSz="685800" rtl="0" eaLnBrk="1" latinLnBrk="0" hangingPunct="1">
-        <a:defRPr sz="1350" kern="1200">
+      <a:lvl2pPr marL="337551" algn="l" defTabSz="675102" rtl="0" eaLnBrk="1" latinLnBrk="0" hangingPunct="1">
+        <a:defRPr sz="1329" kern="1200">
           <a:solidFill>
             <a:schemeClr val="tx1"/>
           </a:solidFill>
@@ -2902,8 +2901,8 @@
           <a:cs typeface="+mn-cs"/>
         </a:defRPr>
       </a:lvl2pPr>
-      <a:lvl3pPr marL="685800" algn="l" defTabSz="685800" rtl="0" eaLnBrk="1" latinLnBrk="0" hangingPunct="1">
-        <a:defRPr sz="1350" kern="1200">
+      <a:lvl3pPr marL="675102" algn="l" defTabSz="675102" rtl="0" eaLnBrk="1" latinLnBrk="0" hangingPunct="1">
+        <a:defRPr sz="1329" kern="1200">
           <a:solidFill>
             <a:schemeClr val="tx1"/>
           </a:solidFill>
@@ -2912,8 +2911,8 @@
           <a:cs typeface="+mn-cs"/>
         </a:defRPr>
       </a:lvl3pPr>
-      <a:lvl4pPr marL="1028700" algn="l" defTabSz="685800" rtl="0" eaLnBrk="1" latinLnBrk="0" hangingPunct="1">
-        <a:defRPr sz="1350" kern="1200">
+      <a:lvl4pPr marL="1012652" algn="l" defTabSz="675102" rtl="0" eaLnBrk="1" latinLnBrk="0" hangingPunct="1">
+        <a:defRPr sz="1329" kern="1200">
           <a:solidFill>
             <a:schemeClr val="tx1"/>
           </a:solidFill>
@@ -2922,8 +2921,8 @@
           <a:cs typeface="+mn-cs"/>
         </a:defRPr>
       </a:lvl4pPr>
-      <a:lvl5pPr marL="1371600" algn="l" defTabSz="685800" rtl="0" eaLnBrk="1" latinLnBrk="0" hangingPunct="1">
-        <a:defRPr sz="1350" kern="1200">
+      <a:lvl5pPr marL="1350203" algn="l" defTabSz="675102" rtl="0" eaLnBrk="1" latinLnBrk="0" hangingPunct="1">
+        <a:defRPr sz="1329" kern="1200">
           <a:solidFill>
             <a:schemeClr val="tx1"/>
           </a:solidFill>
@@ -2932,8 +2931,8 @@
           <a:cs typeface="+mn-cs"/>
         </a:defRPr>
       </a:lvl5pPr>
-      <a:lvl6pPr marL="1714500" algn="l" defTabSz="685800" rtl="0" eaLnBrk="1" latinLnBrk="0" hangingPunct="1">
-        <a:defRPr sz="1350" kern="1200">
+      <a:lvl6pPr marL="1687754" algn="l" defTabSz="675102" rtl="0" eaLnBrk="1" latinLnBrk="0" hangingPunct="1">
+        <a:defRPr sz="1329" kern="1200">
           <a:solidFill>
             <a:schemeClr val="tx1"/>
           </a:solidFill>
@@ -2942,8 +2941,8 @@
           <a:cs typeface="+mn-cs"/>
         </a:defRPr>
       </a:lvl6pPr>
-      <a:lvl7pPr marL="2057400" algn="l" defTabSz="685800" rtl="0" eaLnBrk="1" latinLnBrk="0" hangingPunct="1">
-        <a:defRPr sz="1350" kern="1200">
+      <a:lvl7pPr marL="2025305" algn="l" defTabSz="675102" rtl="0" eaLnBrk="1" latinLnBrk="0" hangingPunct="1">
+        <a:defRPr sz="1329" kern="1200">
           <a:solidFill>
             <a:schemeClr val="tx1"/>
           </a:solidFill>
@@ -2952,8 +2951,8 @@
           <a:cs typeface="+mn-cs"/>
         </a:defRPr>
       </a:lvl7pPr>
-      <a:lvl8pPr marL="2400300" algn="l" defTabSz="685800" rtl="0" eaLnBrk="1" latinLnBrk="0" hangingPunct="1">
-        <a:defRPr sz="1350" kern="1200">
+      <a:lvl8pPr marL="2362855" algn="l" defTabSz="675102" rtl="0" eaLnBrk="1" latinLnBrk="0" hangingPunct="1">
+        <a:defRPr sz="1329" kern="1200">
           <a:solidFill>
             <a:schemeClr val="tx1"/>
           </a:solidFill>
@@ -2962,8 +2961,8 @@
           <a:cs typeface="+mn-cs"/>
         </a:defRPr>
       </a:lvl8pPr>
-      <a:lvl9pPr marL="2743200" algn="l" defTabSz="685800" rtl="0" eaLnBrk="1" latinLnBrk="0" hangingPunct="1">
-        <a:defRPr sz="1350" kern="1200">
+      <a:lvl9pPr marL="2700406" algn="l" defTabSz="675102" rtl="0" eaLnBrk="1" latinLnBrk="0" hangingPunct="1">
+        <a:defRPr sz="1329" kern="1200">
           <a:solidFill>
             <a:schemeClr val="tx1"/>
           </a:solidFill>
@@ -3002,7 +3001,7 @@
         </p:nvSpPr>
         <p:spPr>
           <a:xfrm>
-            <a:off x="99746" y="2797969"/>
+            <a:off x="99746" y="2840714"/>
             <a:ext cx="2088000" cy="396000"/>
           </a:xfrm>
           <a:prstGeom prst="roundRect">
@@ -3062,7 +3061,7 @@
         </p:nvSpPr>
         <p:spPr>
           <a:xfrm>
-            <a:off x="99746" y="2285300"/>
+            <a:off x="99746" y="2328045"/>
             <a:ext cx="2088000" cy="396000"/>
           </a:xfrm>
           <a:prstGeom prst="roundRect">
@@ -3099,18 +3098,13 @@
           <a:p>
             <a:pPr algn="ctr"/>
             <a:r>
-              <a:rPr lang="de-DE" sz="3200" smtClean="0">
+              <a:rPr lang="de-DE" sz="3200">
                 <a:solidFill>
                   <a:schemeClr val="accent2"/>
                 </a:solidFill>
               </a:rPr>
               <a:t>indexFTP</a:t>
             </a:r>
-            <a:endParaRPr lang="de-DE" sz="3200">
-              <a:solidFill>
-                <a:schemeClr val="accent2"/>
-              </a:solidFill>
-            </a:endParaRPr>
           </a:p>
         </p:txBody>
       </p:sp>
@@ -3122,8 +3116,8 @@
         </p:nvSpPr>
         <p:spPr>
           <a:xfrm>
-            <a:off x="4752934" y="4066637"/>
-            <a:ext cx="2088000" cy="396000"/>
+            <a:off x="4881766" y="4496689"/>
+            <a:ext cx="1829166" cy="396000"/>
           </a:xfrm>
           <a:prstGeom prst="roundRect">
             <a:avLst/>
@@ -3159,18 +3153,13 @@
           <a:p>
             <a:pPr algn="ctr"/>
             <a:r>
-              <a:rPr lang="de-DE" sz="3200" err="1">
+              <a:rPr lang="de-DE" sz="3200">
                 <a:solidFill>
-                  <a:schemeClr val="accent2"/>
+                  <a:schemeClr val="accent5"/>
                 </a:solidFill>
               </a:rPr>
               <a:t>readDWD</a:t>
             </a:r>
-            <a:endParaRPr lang="de-DE" sz="3200">
-              <a:solidFill>
-                <a:schemeClr val="accent2"/>
-              </a:solidFill>
-            </a:endParaRPr>
           </a:p>
         </p:txBody>
       </p:sp>
@@ -3182,7 +3171,7 @@
         </p:nvSpPr>
         <p:spPr>
           <a:xfrm>
-            <a:off x="2768110" y="85518"/>
+            <a:off x="2768110" y="128263"/>
             <a:ext cx="2900018" cy="511746"/>
           </a:xfrm>
           <a:prstGeom prst="roundRect">
@@ -3226,15 +3215,7 @@
                   <a:schemeClr val="tx1"/>
                 </a:solidFill>
               </a:rPr>
-              <a:t>rdwd </a:t>
-            </a:r>
-            <a:r>
-              <a:rPr lang="de-DE" sz="3200" smtClean="0">
-                <a:solidFill>
-                  <a:schemeClr val="tx1"/>
-                </a:solidFill>
-              </a:rPr>
-              <a:t>structure </a:t>
+              <a:t>rdwd structure </a:t>
             </a:r>
             <a:endParaRPr lang="de-DE" sz="1400">
               <a:solidFill>
@@ -3252,8 +3233,8 @@
         </p:nvSpPr>
         <p:spPr>
           <a:xfrm>
-            <a:off x="4747280" y="3484578"/>
-            <a:ext cx="2088000" cy="396000"/>
+            <a:off x="4881766" y="3505381"/>
+            <a:ext cx="1829166" cy="396000"/>
           </a:xfrm>
           <a:prstGeom prst="roundRect">
             <a:avLst/>
@@ -3307,7 +3288,7 @@
         </p:nvSpPr>
         <p:spPr>
           <a:xfrm>
-            <a:off x="2455364" y="2290191"/>
+            <a:off x="2455364" y="2332936"/>
             <a:ext cx="2088000" cy="396000"/>
           </a:xfrm>
           <a:prstGeom prst="roundRect">
@@ -3344,7 +3325,7 @@
           <a:p>
             <a:pPr algn="ctr"/>
             <a:r>
-              <a:rPr lang="de-DE" sz="3200" err="1">
+              <a:rPr lang="de-DE" sz="3200">
                 <a:solidFill>
                   <a:schemeClr val="accent6">
                     <a:lumMod val="60000"/>
@@ -3354,14 +3335,6 @@
               </a:rPr>
               <a:t>fileIndex</a:t>
             </a:r>
-            <a:endParaRPr lang="de-DE" sz="3200">
-              <a:solidFill>
-                <a:schemeClr val="accent6">
-                  <a:lumMod val="60000"/>
-                  <a:lumOff val="40000"/>
-                </a:schemeClr>
-              </a:solidFill>
-            </a:endParaRPr>
           </a:p>
         </p:txBody>
       </p:sp>
@@ -3373,7 +3346,7 @@
         </p:nvSpPr>
         <p:spPr>
           <a:xfrm>
-            <a:off x="2455364" y="2798077"/>
+            <a:off x="2455364" y="2840822"/>
             <a:ext cx="2088000" cy="396000"/>
           </a:xfrm>
           <a:prstGeom prst="roundRect">
@@ -3410,7 +3383,7 @@
           <a:p>
             <a:pPr algn="ctr"/>
             <a:r>
-              <a:rPr lang="de-DE" sz="3200" err="1">
+              <a:rPr lang="de-DE" sz="3200">
                 <a:solidFill>
                   <a:schemeClr val="accent6">
                     <a:lumMod val="60000"/>
@@ -3420,14 +3393,6 @@
               </a:rPr>
               <a:t>metaIndex</a:t>
             </a:r>
-            <a:endParaRPr lang="de-DE" sz="3200">
-              <a:solidFill>
-                <a:schemeClr val="accent6">
-                  <a:lumMod val="60000"/>
-                  <a:lumOff val="40000"/>
-                </a:schemeClr>
-              </a:solidFill>
-            </a:endParaRPr>
           </a:p>
         </p:txBody>
       </p:sp>
@@ -3442,7 +3407,7 @@
         </p:nvCxnSpPr>
         <p:spPr>
           <a:xfrm>
-            <a:off x="2187746" y="2995967"/>
+            <a:off x="2187746" y="3038716"/>
             <a:ext cx="267618" cy="107"/>
           </a:xfrm>
           <a:prstGeom prst="straightConnector1">
@@ -3483,7 +3448,7 @@
         </p:nvCxnSpPr>
         <p:spPr>
           <a:xfrm flipV="1">
-            <a:off x="2187746" y="2488192"/>
+            <a:off x="2187746" y="2530937"/>
             <a:ext cx="267618" cy="507778"/>
           </a:xfrm>
           <a:prstGeom prst="straightConnector1">
@@ -3521,7 +3486,7 @@
         </p:nvSpPr>
         <p:spPr>
           <a:xfrm>
-            <a:off x="4747279" y="2518570"/>
+            <a:off x="4747279" y="2561315"/>
             <a:ext cx="2088000" cy="396000"/>
           </a:xfrm>
           <a:prstGeom prst="roundRect">
@@ -3579,7 +3544,7 @@
         </p:nvCxnSpPr>
         <p:spPr>
           <a:xfrm>
-            <a:off x="1143746" y="2681296"/>
+            <a:off x="1143746" y="2724045"/>
             <a:ext cx="0" cy="116671"/>
           </a:xfrm>
           <a:prstGeom prst="straightConnector1">
@@ -3620,7 +3585,7 @@
         </p:nvCxnSpPr>
         <p:spPr>
           <a:xfrm flipV="1">
-            <a:off x="4543374" y="2716571"/>
+            <a:off x="4543378" y="2759316"/>
             <a:ext cx="203915" cy="279508"/>
           </a:xfrm>
           <a:prstGeom prst="straightConnector1">
@@ -3661,7 +3626,7 @@
         </p:nvCxnSpPr>
         <p:spPr>
           <a:xfrm>
-            <a:off x="4543374" y="2488193"/>
+            <a:off x="4543378" y="2530942"/>
             <a:ext cx="203915" cy="228377"/>
           </a:xfrm>
           <a:prstGeom prst="straightConnector1">
@@ -3695,6 +3660,7 @@
         <p:nvCxnSpPr>
           <p:cNvPr id="215" name="Gerade Verbindung mit Pfeil 214"/>
           <p:cNvCxnSpPr>
+            <a:cxnSpLocks/>
             <a:stCxn id="206" idx="2"/>
             <a:endCxn id="204" idx="0"/>
           </p:cNvCxnSpPr>
@@ -3702,8 +3668,8 @@
         </p:nvCxnSpPr>
         <p:spPr>
           <a:xfrm>
-            <a:off x="5791280" y="3880582"/>
-            <a:ext cx="5654" cy="186057"/>
+            <a:off x="5796349" y="3901381"/>
+            <a:ext cx="0" cy="595308"/>
           </a:xfrm>
           <a:prstGeom prst="straightConnector1">
             <a:avLst/>
@@ -3742,7 +3708,7 @@
         </p:nvCxnSpPr>
         <p:spPr>
           <a:xfrm>
-            <a:off x="5791278" y="2038734"/>
+            <a:off x="5791282" y="2081479"/>
             <a:ext cx="1" cy="479836"/>
           </a:xfrm>
           <a:prstGeom prst="straightConnector1">
@@ -3780,7 +3746,7 @@
         </p:nvSpPr>
         <p:spPr>
           <a:xfrm>
-            <a:off x="7059123" y="2633489"/>
+            <a:off x="7059123" y="2676238"/>
             <a:ext cx="1829166" cy="1200329"/>
           </a:xfrm>
           <a:prstGeom prst="rect">
@@ -3801,20 +3767,36 @@
           <a:lstStyle/>
           <a:p>
             <a:r>
+              <a:rPr lang="de-DE" b="1"/>
+              <a:t>dir</a:t>
+            </a:r>
+            <a:r>
               <a:rPr lang="de-DE"/>
-              <a:t>dir, force?,</a:t>
-            </a:r>
-          </a:p>
-          <a:p>
+              <a:t>, force?,</a:t>
+            </a:r>
+          </a:p>
+          <a:p>
+            <a:r>
+              <a:rPr lang="de-DE" b="1"/>
+              <a:t>sleep</a:t>
+            </a:r>
             <a:r>
               <a:rPr lang="de-DE"/>
-              <a:t>sleep, quiet?,</a:t>
+              <a:t>, quiet?,</a:t>
             </a:r>
           </a:p>
           <a:p>
             <a:r>
               <a:rPr lang="de-DE"/>
-              <a:t>progbar?, ntrunc, browse?, read?</a:t>
+              <a:t>progbar?, browse?, </a:t>
+            </a:r>
+            <a:r>
+              <a:rPr lang="de-DE" b="1"/>
+              <a:t>read</a:t>
+            </a:r>
+            <a:r>
+              <a:rPr lang="de-DE"/>
+              <a:t>?</a:t>
             </a:r>
           </a:p>
         </p:txBody>
@@ -3827,7 +3809,7 @@
         </p:nvSpPr>
         <p:spPr>
           <a:xfrm>
-            <a:off x="2455364" y="3305961"/>
+            <a:off x="2455364" y="3348710"/>
             <a:ext cx="2088000" cy="449351"/>
           </a:xfrm>
           <a:prstGeom prst="roundRect">
@@ -3864,7 +3846,7 @@
           <a:p>
             <a:pPr algn="ctr"/>
             <a:r>
-              <a:rPr lang="de-DE" sz="3200" smtClean="0">
+              <a:rPr lang="de-DE" sz="3200">
                 <a:solidFill>
                   <a:schemeClr val="accent6">
                     <a:lumMod val="60000"/>
@@ -3874,14 +3856,6 @@
               </a:rPr>
               <a:t>geoIndex</a:t>
             </a:r>
-            <a:endParaRPr lang="de-DE" sz="3200">
-              <a:solidFill>
-                <a:schemeClr val="accent6">
-                  <a:lumMod val="60000"/>
-                  <a:lumOff val="40000"/>
-                </a:schemeClr>
-              </a:solidFill>
-            </a:endParaRPr>
           </a:p>
         </p:txBody>
       </p:sp>
@@ -3893,7 +3867,7 @@
         </p:nvSpPr>
         <p:spPr>
           <a:xfrm>
-            <a:off x="2578950" y="832761"/>
+            <a:off x="2578954" y="875506"/>
             <a:ext cx="1445269" cy="396000"/>
           </a:xfrm>
           <a:prstGeom prst="roundRect">
@@ -3948,7 +3922,7 @@
         </p:nvSpPr>
         <p:spPr>
           <a:xfrm>
-            <a:off x="2261892" y="1392403"/>
+            <a:off x="2261896" y="1435152"/>
             <a:ext cx="2079385" cy="646331"/>
           </a:xfrm>
           <a:prstGeom prst="rect">
@@ -3973,16 +3947,15 @@
               <a:t>name</a:t>
             </a:r>
             <a:r>
-              <a:rPr lang="de-DE" smtClean="0"/>
+              <a:rPr lang="de-DE"/>
               <a:t>, exactmatch?, </a:t>
             </a:r>
           </a:p>
           <a:p>
             <a:r>
-              <a:rPr lang="de-DE" smtClean="0"/>
+              <a:rPr lang="de-DE"/>
               <a:t>mindex</a:t>
             </a:r>
-            <a:endParaRPr lang="de-DE"/>
           </a:p>
         </p:txBody>
       </p:sp>
@@ -3997,7 +3970,7 @@
         </p:nvCxnSpPr>
         <p:spPr>
           <a:xfrm flipV="1">
-            <a:off x="3301585" y="1228761"/>
+            <a:off x="3301585" y="1271506"/>
             <a:ext cx="0" cy="163642"/>
           </a:xfrm>
           <a:prstGeom prst="straightConnector1">
@@ -4035,8 +4008,8 @@
         </p:nvSpPr>
         <p:spPr>
           <a:xfrm>
-            <a:off x="7059123" y="3941475"/>
-            <a:ext cx="1829166" cy="646331"/>
+            <a:off x="7059123" y="3984224"/>
+            <a:ext cx="1829166" cy="1169551"/>
           </a:xfrm>
           <a:prstGeom prst="rect">
             <a:avLst/>
@@ -4061,13 +4034,25 @@
             </a:r>
             <a:r>
               <a:rPr lang="de-DE"/>
-              <a:t>, dir, </a:t>
-            </a:r>
-          </a:p>
-          <a:p>
+              <a:t>, </a:t>
+            </a:r>
+            <a:r>
+              <a:rPr lang="de-DE" b="1"/>
+              <a:t>fread</a:t>
+            </a:r>
             <a:r>
               <a:rPr lang="de-DE"/>
-              <a:t>meta?, format, tz</a:t>
+              <a:t>?, varnames?,</a:t>
+            </a:r>
+          </a:p>
+          <a:p>
+            <a:r>
+              <a:rPr lang="de-DE" sz="1600"/>
+              <a:t>meta/binary/raster, </a:t>
+            </a:r>
+            <a:r>
+              <a:rPr lang="de-DE"/>
+              <a:t>format, tz</a:t>
             </a:r>
           </a:p>
         </p:txBody>
@@ -4083,7 +4068,7 @@
         </p:nvCxnSpPr>
         <p:spPr>
           <a:xfrm>
-            <a:off x="2187746" y="2995969"/>
+            <a:off x="2187746" y="3038714"/>
             <a:ext cx="267618" cy="534668"/>
           </a:xfrm>
           <a:prstGeom prst="straightConnector1">
@@ -4117,15 +4102,14 @@
         <p:nvCxnSpPr>
           <p:cNvPr id="229" name="Gerade Verbindung mit Pfeil 228"/>
           <p:cNvCxnSpPr>
-            <a:stCxn id="219" idx="2"/>
-            <a:endCxn id="44" idx="0"/>
+            <a:cxnSpLocks/>
           </p:cNvCxnSpPr>
           <p:nvPr/>
         </p:nvCxnSpPr>
         <p:spPr>
-          <a:xfrm>
-            <a:off x="3499364" y="3755312"/>
-            <a:ext cx="0" cy="312375"/>
+          <a:xfrm flipH="1">
+            <a:off x="2771254" y="3805908"/>
+            <a:ext cx="942" cy="742821"/>
           </a:xfrm>
           <a:prstGeom prst="straightConnector1">
             <a:avLst/>
@@ -4162,7 +4146,7 @@
         </p:nvSpPr>
         <p:spPr>
           <a:xfrm>
-            <a:off x="99746" y="3440876"/>
+            <a:off x="99746" y="3483621"/>
             <a:ext cx="2088000" cy="396000"/>
           </a:xfrm>
           <a:prstGeom prst="roundRect">
@@ -4213,6 +4197,7 @@
         <p:nvCxnSpPr>
           <p:cNvPr id="232" name="Gerade Verbindung mit Pfeil 231"/>
           <p:cNvCxnSpPr>
+            <a:cxnSpLocks/>
             <a:stCxn id="211" idx="2"/>
             <a:endCxn id="206" idx="0"/>
           </p:cNvCxnSpPr>
@@ -4220,8 +4205,8 @@
         </p:nvCxnSpPr>
         <p:spPr>
           <a:xfrm>
-            <a:off x="5791289" y="2914572"/>
-            <a:ext cx="1" cy="570009"/>
+            <a:off x="5791279" y="2957315"/>
+            <a:ext cx="5070" cy="548066"/>
           </a:xfrm>
           <a:prstGeom prst="straightConnector1">
             <a:avLst/>
@@ -4254,15 +4239,15 @@
         <p:nvCxnSpPr>
           <p:cNvPr id="233" name="Gerade Verbindung mit Pfeil 232"/>
           <p:cNvCxnSpPr>
-            <a:stCxn id="223" idx="1"/>
+            <a:cxnSpLocks/>
             <a:endCxn id="204" idx="3"/>
           </p:cNvCxnSpPr>
           <p:nvPr/>
         </p:nvCxnSpPr>
         <p:spPr>
-          <a:xfrm flipH="1" flipV="1">
-            <a:off x="6840934" y="4264637"/>
-            <a:ext cx="218189" cy="4"/>
+          <a:xfrm flipH="1">
+            <a:off x="6710932" y="4694689"/>
+            <a:ext cx="348192" cy="0"/>
           </a:xfrm>
           <a:prstGeom prst="straightConnector1">
             <a:avLst/>
@@ -4299,7 +4284,7 @@
         </p:nvGrpSpPr>
         <p:grpSpPr>
           <a:xfrm>
-            <a:off x="99746" y="99060"/>
+            <a:off x="99746" y="141805"/>
             <a:ext cx="2088000" cy="1981200"/>
             <a:chOff x="130226" y="175260"/>
             <a:chExt cx="2088000" cy="1981200"/>
@@ -4557,13 +4542,8 @@
               </a:r>
               <a:r>
                 <a:rPr lang="de-DE"/>
-                <a:t> </a:t>
+                <a:t> argument</a:t>
               </a:r>
-              <a:r>
-                <a:rPr lang="de-DE" smtClean="0"/>
-                <a:t>argument</a:t>
-              </a:r>
-              <a:endParaRPr lang="de-DE"/>
             </a:p>
           </p:txBody>
         </p:sp>
@@ -4576,7 +4556,7 @@
         </p:nvSpPr>
         <p:spPr>
           <a:xfrm>
-            <a:off x="5450480" y="85518"/>
+            <a:off x="5450484" y="128263"/>
             <a:ext cx="2527083" cy="511746"/>
           </a:xfrm>
           <a:prstGeom prst="roundRect">
@@ -4638,14 +4618,15 @@
         <p:nvCxnSpPr>
           <p:cNvPr id="241" name="Gerade Verbindung mit Pfeil 240"/>
           <p:cNvCxnSpPr>
+            <a:cxnSpLocks/>
             <a:endCxn id="206" idx="3"/>
           </p:cNvCxnSpPr>
           <p:nvPr/>
         </p:nvCxnSpPr>
         <p:spPr>
           <a:xfrm flipH="1">
-            <a:off x="6835290" y="3682576"/>
-            <a:ext cx="223843" cy="0"/>
+            <a:off x="6710932" y="3703379"/>
+            <a:ext cx="323592" cy="2"/>
           </a:xfrm>
           <a:prstGeom prst="straightConnector1">
             <a:avLst/>
@@ -4682,7 +4663,7 @@
         </p:nvSpPr>
         <p:spPr>
           <a:xfrm>
-            <a:off x="5450480" y="2983317"/>
+            <a:off x="5450484" y="3026062"/>
             <a:ext cx="681597" cy="369332"/>
           </a:xfrm>
           <a:prstGeom prst="rect">
@@ -4706,12 +4687,8 @@
           <a:lstStyle/>
           <a:p>
             <a:r>
-              <a:rPr lang="de-DE" b="1" smtClean="0"/>
-              <a:t>url(s</a:t>
-            </a:r>
-            <a:r>
               <a:rPr lang="de-DE" b="1"/>
-              <a:t>)</a:t>
+              <a:t>url(s)</a:t>
             </a:r>
           </a:p>
         </p:txBody>
@@ -4724,7 +4701,7 @@
         </p:nvSpPr>
         <p:spPr>
           <a:xfrm>
-            <a:off x="6282260" y="1894191"/>
+            <a:off x="6282264" y="1936936"/>
             <a:ext cx="2606027" cy="396000"/>
           </a:xfrm>
           <a:prstGeom prst="roundRect">
@@ -4779,8 +4756,8 @@
         </p:nvSpPr>
         <p:spPr>
           <a:xfrm>
-            <a:off x="2455364" y="4067687"/>
-            <a:ext cx="2088000" cy="396000"/>
+            <a:off x="1122498" y="4548729"/>
+            <a:ext cx="1932839" cy="899943"/>
           </a:xfrm>
           <a:prstGeom prst="roundRect">
             <a:avLst/>
@@ -4816,9 +4793,13 @@
           <a:bodyPr lIns="36000" tIns="36000" rIns="36000" bIns="36000" rtlCol="0" anchor="ctr"/>
           <a:lstStyle/>
           <a:p>
-            <a:pPr algn="ctr"/>
-            <a:r>
-              <a:rPr lang="de-DE" sz="2400">
+            <a:pPr algn="ctr">
+              <a:lnSpc>
+                <a:spcPts val="3200"/>
+              </a:lnSpc>
+            </a:pPr>
+            <a:r>
+              <a:rPr lang="de-DE" sz="3200">
                 <a:solidFill>
                   <a:schemeClr val="accent6">
                     <a:lumMod val="60000"/>
@@ -4826,10 +4807,17 @@
                   </a:schemeClr>
                 </a:solidFill>
               </a:rPr>
-              <a:t>i</a:t>
-            </a:r>
-            <a:r>
-              <a:rPr lang="de-DE" sz="2400" smtClean="0">
+              <a:t>interactive</a:t>
+            </a:r>
+          </a:p>
+          <a:p>
+            <a:pPr algn="ctr">
+              <a:lnSpc>
+                <a:spcPts val="3200"/>
+              </a:lnSpc>
+            </a:pPr>
+            <a:r>
+              <a:rPr lang="de-DE" sz="3200">
                 <a:solidFill>
                   <a:schemeClr val="accent6">
                     <a:lumMod val="60000"/>
@@ -4837,16 +4825,8 @@
                   </a:schemeClr>
                 </a:solidFill>
               </a:rPr>
-              <a:t>nteractive map</a:t>
-            </a:r>
-            <a:endParaRPr lang="de-DE" sz="2400">
-              <a:solidFill>
-                <a:schemeClr val="accent6">
-                  <a:lumMod val="60000"/>
-                  <a:lumOff val="40000"/>
-                </a:schemeClr>
-              </a:solidFill>
-            </a:endParaRPr>
+              <a:t>map</a:t>
+            </a:r>
           </a:p>
         </p:txBody>
       </p:sp>
@@ -4858,7 +4838,7 @@
         </p:nvSpPr>
         <p:spPr>
           <a:xfrm>
-            <a:off x="4477511" y="838405"/>
+            <a:off x="4477511" y="881154"/>
             <a:ext cx="1699452" cy="1200329"/>
           </a:xfrm>
           <a:prstGeom prst="rect">
@@ -4882,26 +4862,18 @@
           <a:lstStyle/>
           <a:p>
             <a:r>
-              <a:rPr lang="de-DE" b="1" smtClean="0"/>
+              <a:rPr lang="de-DE" b="1"/>
               <a:t>  id</a:t>
             </a:r>
             <a:r>
-              <a:rPr lang="de-DE" smtClean="0"/>
-              <a:t> </a:t>
-            </a:r>
-            <a:r>
               <a:rPr lang="de-DE"/>
-              <a:t>/ name,</a:t>
-            </a:r>
-          </a:p>
-          <a:p>
-            <a:r>
-              <a:rPr lang="de-DE" b="1" smtClean="0"/>
-              <a:t>res</a:t>
-            </a:r>
+              <a:t> / name,</a:t>
+            </a:r>
+          </a:p>
+          <a:p>
             <a:r>
               <a:rPr lang="de-DE" b="1"/>
-              <a:t>, var, per</a:t>
+              <a:t>res, var, per</a:t>
             </a:r>
             <a:r>
               <a:rPr lang="de-DE"/>
@@ -4910,26 +4882,18 @@
           </a:p>
           <a:p>
             <a:r>
-              <a:rPr lang="de-DE" smtClean="0"/>
-              <a:t>base, findex</a:t>
-            </a:r>
-            <a:r>
               <a:rPr lang="de-DE"/>
-              <a:t>,</a:t>
-            </a:r>
-          </a:p>
-          <a:p>
-            <a:r>
-              <a:rPr lang="de-DE" smtClean="0"/>
+              <a:t>base, outvec?,</a:t>
+            </a:r>
+          </a:p>
+          <a:p>
+            <a:r>
+              <a:rPr lang="de-DE"/>
               <a:t>current?, </a:t>
             </a:r>
             <a:r>
-              <a:rPr lang="de-DE" b="1" smtClean="0"/>
-              <a:t>meta</a:t>
-            </a:r>
-            <a:r>
               <a:rPr lang="de-DE" b="1"/>
-              <a:t>?</a:t>
+              <a:t>meta?</a:t>
             </a:r>
           </a:p>
         </p:txBody>
@@ -4942,7 +4906,7 @@
         </p:nvSpPr>
         <p:spPr>
           <a:xfrm>
-            <a:off x="6735547" y="838475"/>
+            <a:off x="6735547" y="881220"/>
             <a:ext cx="1699452" cy="923330"/>
           </a:xfrm>
           <a:prstGeom prst="rect">
@@ -4966,28 +4930,23 @@
           <a:lstStyle/>
           <a:p>
             <a:r>
-              <a:rPr lang="de-DE" b="1" smtClean="0"/>
+              <a:rPr lang="de-DE" b="1"/>
               <a:t>lat, lon, radius</a:t>
             </a:r>
             <a:r>
-              <a:rPr lang="de-DE" smtClean="0"/>
+              <a:rPr lang="de-DE"/>
               <a:t>,</a:t>
             </a:r>
-            <a:endParaRPr lang="de-DE"/>
-          </a:p>
-          <a:p>
-            <a:r>
-              <a:rPr lang="de-DE" smtClean="0"/>
-              <a:t>res</a:t>
-            </a:r>
+          </a:p>
+          <a:p>
             <a:r>
               <a:rPr lang="de-DE"/>
-              <a:t>, var, per,</a:t>
-            </a:r>
-          </a:p>
-          <a:p>
-            <a:r>
-              <a:rPr lang="de-DE" smtClean="0"/>
+              <a:t>res, var, per,</a:t>
+            </a:r>
+          </a:p>
+          <a:p>
+            <a:r>
+              <a:rPr lang="de-DE"/>
               <a:t>mindate</a:t>
             </a:r>
             <a:endParaRPr lang="de-DE" b="1"/>
@@ -5004,7 +4963,7 @@
         </p:nvCxnSpPr>
         <p:spPr>
           <a:xfrm>
-            <a:off x="4024219" y="1030761"/>
+            <a:off x="4024219" y="1073506"/>
             <a:ext cx="621112" cy="0"/>
           </a:xfrm>
           <a:prstGeom prst="straightConnector1">
@@ -5045,7 +5004,7 @@
         </p:nvCxnSpPr>
         <p:spPr>
           <a:xfrm>
-            <a:off x="7585273" y="1761805"/>
+            <a:off x="7585277" y="1804550"/>
             <a:ext cx="1" cy="132386"/>
           </a:xfrm>
           <a:prstGeom prst="straightConnector1">
@@ -5086,7 +5045,7 @@
         </p:nvCxnSpPr>
         <p:spPr>
           <a:xfrm flipH="1">
-            <a:off x="6132077" y="2290191"/>
+            <a:off x="6132081" y="2332936"/>
             <a:ext cx="1453197" cy="877792"/>
           </a:xfrm>
           <a:prstGeom prst="straightConnector1">
@@ -5124,7 +5083,7 @@
         </p:nvCxnSpPr>
         <p:spPr>
           <a:xfrm flipH="1">
-            <a:off x="2187746" y="3167983"/>
+            <a:off x="2187746" y="3210732"/>
             <a:ext cx="267618" cy="272893"/>
           </a:xfrm>
           <a:prstGeom prst="straightConnector1">
@@ -5148,6 +5107,597 @@
           </a:fillRef>
           <a:effectRef idx="0">
             <a:schemeClr val="accent2"/>
+          </a:effectRef>
+          <a:fontRef idx="minor">
+            <a:schemeClr val="tx1"/>
+          </a:fontRef>
+        </p:style>
+      </p:cxnSp>
+      <p:sp>
+        <p:nvSpPr>
+          <p:cNvPr id="47" name="Abgerundetes Rechteck 203">
+            <a:extLst>
+              <a:ext uri="{FF2B5EF4-FFF2-40B4-BE49-F238E27FC236}">
+                <a16:creationId xmlns:a16="http://schemas.microsoft.com/office/drawing/2014/main" id="{2F1CD618-E542-4D27-AE3A-DF2F8A1FB408}"/>
+              </a:ext>
+            </a:extLst>
+          </p:cNvPr>
+          <p:cNvSpPr/>
+          <p:nvPr/>
+        </p:nvSpPr>
+        <p:spPr>
+          <a:xfrm>
+            <a:off x="3499366" y="3953495"/>
+            <a:ext cx="1045479" cy="396000"/>
+          </a:xfrm>
+          <a:prstGeom prst="roundRect">
+            <a:avLst/>
+          </a:prstGeom>
+          <a:solidFill>
+            <a:schemeClr val="bg2">
+              <a:alpha val="91000"/>
+            </a:schemeClr>
+          </a:solidFill>
+          <a:ln>
+            <a:noFill/>
+          </a:ln>
+        </p:spPr>
+        <p:style>
+          <a:lnRef idx="2">
+            <a:schemeClr val="accent1">
+              <a:shade val="50000"/>
+            </a:schemeClr>
+          </a:lnRef>
+          <a:fillRef idx="1">
+            <a:schemeClr val="accent1"/>
+          </a:fillRef>
+          <a:effectRef idx="0">
+            <a:schemeClr val="accent1"/>
+          </a:effectRef>
+          <a:fontRef idx="minor">
+            <a:schemeClr val="lt1"/>
+          </a:fontRef>
+        </p:style>
+        <p:txBody>
+          <a:bodyPr lIns="36000" tIns="36000" rIns="36000" bIns="36000" rtlCol="0" anchor="ctr"/>
+          <a:lstStyle/>
+          <a:p>
+            <a:pPr algn="ctr"/>
+            <a:r>
+              <a:rPr lang="de-DE">
+                <a:solidFill>
+                  <a:schemeClr val="accent5"/>
+                </a:solidFill>
+              </a:rPr>
+              <a:t>readMeta</a:t>
+            </a:r>
+          </a:p>
+        </p:txBody>
+      </p:sp>
+      <p:sp>
+        <p:nvSpPr>
+          <p:cNvPr id="48" name="Abgerundetes Rechteck 203">
+            <a:extLst>
+              <a:ext uri="{FF2B5EF4-FFF2-40B4-BE49-F238E27FC236}">
+                <a16:creationId xmlns:a16="http://schemas.microsoft.com/office/drawing/2014/main" id="{09FF9ADA-D2E2-44DB-ADB0-15744BC13962}"/>
+              </a:ext>
+            </a:extLst>
+          </p:cNvPr>
+          <p:cNvSpPr/>
+          <p:nvPr/>
+        </p:nvSpPr>
+        <p:spPr>
+          <a:xfrm>
+            <a:off x="3501899" y="4443539"/>
+            <a:ext cx="1040410" cy="396000"/>
+          </a:xfrm>
+          <a:prstGeom prst="roundRect">
+            <a:avLst/>
+          </a:prstGeom>
+          <a:solidFill>
+            <a:schemeClr val="bg2">
+              <a:alpha val="91000"/>
+            </a:schemeClr>
+          </a:solidFill>
+          <a:ln>
+            <a:noFill/>
+          </a:ln>
+        </p:spPr>
+        <p:style>
+          <a:lnRef idx="2">
+            <a:schemeClr val="accent1">
+              <a:shade val="50000"/>
+            </a:schemeClr>
+          </a:lnRef>
+          <a:fillRef idx="1">
+            <a:schemeClr val="accent1"/>
+          </a:fillRef>
+          <a:effectRef idx="0">
+            <a:schemeClr val="accent1"/>
+          </a:effectRef>
+          <a:fontRef idx="minor">
+            <a:schemeClr val="lt1"/>
+          </a:fontRef>
+        </p:style>
+        <p:txBody>
+          <a:bodyPr lIns="36000" tIns="36000" rIns="36000" bIns="36000" rtlCol="0" anchor="ctr"/>
+          <a:lstStyle/>
+          <a:p>
+            <a:pPr algn="ctr"/>
+            <a:r>
+              <a:rPr lang="de-DE">
+                <a:solidFill>
+                  <a:schemeClr val="accent5"/>
+                </a:solidFill>
+              </a:rPr>
+              <a:t>readVars</a:t>
+            </a:r>
+          </a:p>
+        </p:txBody>
+      </p:sp>
+      <p:sp>
+        <p:nvSpPr>
+          <p:cNvPr id="49" name="Abgerundetes Rechteck 203">
+            <a:extLst>
+              <a:ext uri="{FF2B5EF4-FFF2-40B4-BE49-F238E27FC236}">
+                <a16:creationId xmlns:a16="http://schemas.microsoft.com/office/drawing/2014/main" id="{AB1E6D48-01F3-40D2-9A40-C455B2A2F21B}"/>
+              </a:ext>
+            </a:extLst>
+          </p:cNvPr>
+          <p:cNvSpPr/>
+          <p:nvPr/>
+        </p:nvSpPr>
+        <p:spPr>
+          <a:xfrm>
+            <a:off x="4847250" y="5055800"/>
+            <a:ext cx="1898198" cy="396000"/>
+          </a:xfrm>
+          <a:prstGeom prst="roundRect">
+            <a:avLst/>
+          </a:prstGeom>
+          <a:solidFill>
+            <a:schemeClr val="bg2">
+              <a:alpha val="91000"/>
+            </a:schemeClr>
+          </a:solidFill>
+          <a:ln>
+            <a:noFill/>
+          </a:ln>
+        </p:spPr>
+        <p:style>
+          <a:lnRef idx="2">
+            <a:schemeClr val="accent1">
+              <a:shade val="50000"/>
+            </a:schemeClr>
+          </a:lnRef>
+          <a:fillRef idx="1">
+            <a:schemeClr val="accent1"/>
+          </a:fillRef>
+          <a:effectRef idx="0">
+            <a:schemeClr val="accent1"/>
+          </a:effectRef>
+          <a:fontRef idx="minor">
+            <a:schemeClr val="lt1"/>
+          </a:fontRef>
+        </p:style>
+        <p:txBody>
+          <a:bodyPr lIns="36000" tIns="36000" rIns="36000" bIns="36000" rtlCol="0" anchor="ctr"/>
+          <a:lstStyle/>
+          <a:p>
+            <a:pPr algn="ctr"/>
+            <a:r>
+              <a:rPr lang="de-DE">
+                <a:solidFill>
+                  <a:schemeClr val="accent2"/>
+                </a:solidFill>
+              </a:rPr>
+              <a:t>newColumnNames</a:t>
+            </a:r>
+          </a:p>
+        </p:txBody>
+      </p:sp>
+      <p:sp>
+        <p:nvSpPr>
+          <p:cNvPr id="52" name="Abgerundetes Rechteck 237">
+            <a:extLst>
+              <a:ext uri="{FF2B5EF4-FFF2-40B4-BE49-F238E27FC236}">
+                <a16:creationId xmlns:a16="http://schemas.microsoft.com/office/drawing/2014/main" id="{271BBA81-28EA-48A5-A04B-FA404675CC8D}"/>
+              </a:ext>
+            </a:extLst>
+          </p:cNvPr>
+          <p:cNvSpPr/>
+          <p:nvPr/>
+        </p:nvSpPr>
+        <p:spPr>
+          <a:xfrm>
+            <a:off x="3308449" y="5052936"/>
+            <a:ext cx="1233859" cy="396000"/>
+          </a:xfrm>
+          <a:prstGeom prst="roundRect">
+            <a:avLst/>
+          </a:prstGeom>
+          <a:solidFill>
+            <a:schemeClr val="bg2">
+              <a:alpha val="91000"/>
+            </a:schemeClr>
+          </a:solidFill>
+          <a:ln>
+            <a:noFill/>
+          </a:ln>
+        </p:spPr>
+        <p:style>
+          <a:lnRef idx="2">
+            <a:schemeClr val="accent1">
+              <a:shade val="50000"/>
+            </a:schemeClr>
+          </a:lnRef>
+          <a:fillRef idx="1">
+            <a:schemeClr val="accent1"/>
+          </a:fillRef>
+          <a:effectRef idx="0">
+            <a:schemeClr val="accent1"/>
+          </a:effectRef>
+          <a:fontRef idx="minor">
+            <a:schemeClr val="lt1"/>
+          </a:fontRef>
+        </p:style>
+        <p:txBody>
+          <a:bodyPr lIns="36000" tIns="36000" rIns="36000" bIns="36000" rtlCol="0" anchor="ctr"/>
+          <a:lstStyle/>
+          <a:p>
+            <a:pPr algn="ctr"/>
+            <a:r>
+              <a:rPr lang="de-DE">
+                <a:solidFill>
+                  <a:schemeClr val="accent6">
+                    <a:lumMod val="60000"/>
+                    <a:lumOff val="40000"/>
+                  </a:schemeClr>
+                </a:solidFill>
+              </a:rPr>
+              <a:t>dwdparams</a:t>
+            </a:r>
+          </a:p>
+        </p:txBody>
+      </p:sp>
+      <p:sp>
+        <p:nvSpPr>
+          <p:cNvPr id="54" name="Abgerundetes Rechteck 229">
+            <a:extLst>
+              <a:ext uri="{FF2B5EF4-FFF2-40B4-BE49-F238E27FC236}">
+                <a16:creationId xmlns:a16="http://schemas.microsoft.com/office/drawing/2014/main" id="{A8F5462F-81BD-46BA-9C69-EFA257CD3D50}"/>
+              </a:ext>
+            </a:extLst>
+          </p:cNvPr>
+          <p:cNvSpPr/>
+          <p:nvPr/>
+        </p:nvSpPr>
+        <p:spPr>
+          <a:xfrm>
+            <a:off x="1587631" y="4041691"/>
+            <a:ext cx="1183472" cy="396000"/>
+          </a:xfrm>
+          <a:prstGeom prst="roundRect">
+            <a:avLst/>
+          </a:prstGeom>
+          <a:solidFill>
+            <a:schemeClr val="bg2">
+              <a:alpha val="91000"/>
+            </a:schemeClr>
+          </a:solidFill>
+          <a:ln>
+            <a:noFill/>
+          </a:ln>
+        </p:spPr>
+        <p:style>
+          <a:lnRef idx="2">
+            <a:schemeClr val="accent1">
+              <a:shade val="50000"/>
+            </a:schemeClr>
+          </a:lnRef>
+          <a:fillRef idx="1">
+            <a:schemeClr val="accent1"/>
+          </a:fillRef>
+          <a:effectRef idx="0">
+            <a:schemeClr val="accent1"/>
+          </a:effectRef>
+          <a:fontRef idx="minor">
+            <a:schemeClr val="lt1"/>
+          </a:fontRef>
+        </p:style>
+        <p:txBody>
+          <a:bodyPr lIns="36000" tIns="36000" rIns="36000" bIns="36000" rtlCol="0" anchor="ctr"/>
+          <a:lstStyle/>
+          <a:p>
+            <a:pPr algn="ctr"/>
+            <a:r>
+              <a:rPr lang="de-DE">
+                <a:solidFill>
+                  <a:schemeClr val="accent2"/>
+                </a:solidFill>
+              </a:rPr>
+              <a:t>rowDisplay</a:t>
+            </a:r>
+          </a:p>
+        </p:txBody>
+      </p:sp>
+      <p:sp>
+        <p:nvSpPr>
+          <p:cNvPr id="58" name="Rechteck 241">
+            <a:extLst>
+              <a:ext uri="{FF2B5EF4-FFF2-40B4-BE49-F238E27FC236}">
+                <a16:creationId xmlns:a16="http://schemas.microsoft.com/office/drawing/2014/main" id="{F5D8A9C9-689C-4F67-9419-6C0DBE1D0C69}"/>
+              </a:ext>
+            </a:extLst>
+          </p:cNvPr>
+          <p:cNvSpPr/>
+          <p:nvPr/>
+        </p:nvSpPr>
+        <p:spPr>
+          <a:xfrm>
+            <a:off x="5268540" y="3982936"/>
+            <a:ext cx="1045479" cy="369332"/>
+          </a:xfrm>
+          <a:prstGeom prst="rect">
+            <a:avLst/>
+          </a:prstGeom>
+          <a:solidFill>
+            <a:schemeClr val="bg1"/>
+          </a:solidFill>
+          <a:ln>
+            <a:solidFill>
+              <a:schemeClr val="bg1">
+                <a:lumMod val="50000"/>
+              </a:schemeClr>
+            </a:solidFill>
+          </a:ln>
+        </p:spPr>
+        <p:txBody>
+          <a:bodyPr wrap="none">
+            <a:spAutoFit/>
+          </a:bodyPr>
+          <a:lstStyle/>
+          <a:p>
+            <a:r>
+              <a:rPr lang="de-DE" b="1"/>
+              <a:t>(zip) files</a:t>
+            </a:r>
+          </a:p>
+        </p:txBody>
+      </p:sp>
+      <p:cxnSp>
+        <p:nvCxnSpPr>
+          <p:cNvPr id="85" name="Gerade Verbindung mit Pfeil 231">
+            <a:extLst>
+              <a:ext uri="{FF2B5EF4-FFF2-40B4-BE49-F238E27FC236}">
+                <a16:creationId xmlns:a16="http://schemas.microsoft.com/office/drawing/2014/main" id="{7A38B048-AFD4-4F4F-AA11-2AC41CF28C48}"/>
+              </a:ext>
+            </a:extLst>
+          </p:cNvPr>
+          <p:cNvCxnSpPr>
+            <a:cxnSpLocks/>
+            <a:stCxn id="49" idx="0"/>
+            <a:endCxn id="204" idx="2"/>
+          </p:cNvCxnSpPr>
+          <p:nvPr/>
+        </p:nvCxnSpPr>
+        <p:spPr>
+          <a:xfrm flipV="1">
+            <a:off x="5796349" y="4892689"/>
+            <a:ext cx="0" cy="163111"/>
+          </a:xfrm>
+          <a:prstGeom prst="straightConnector1">
+            <a:avLst/>
+          </a:prstGeom>
+          <a:ln>
+            <a:solidFill>
+              <a:schemeClr val="bg1">
+                <a:lumMod val="50000"/>
+              </a:schemeClr>
+            </a:solidFill>
+            <a:tailEnd type="triangle"/>
+          </a:ln>
+        </p:spPr>
+        <p:style>
+          <a:lnRef idx="1">
+            <a:schemeClr val="accent1"/>
+          </a:lnRef>
+          <a:fillRef idx="0">
+            <a:schemeClr val="accent1"/>
+          </a:fillRef>
+          <a:effectRef idx="0">
+            <a:schemeClr val="accent1"/>
+          </a:effectRef>
+          <a:fontRef idx="minor">
+            <a:schemeClr val="tx1"/>
+          </a:fontRef>
+        </p:style>
+      </p:cxnSp>
+      <p:cxnSp>
+        <p:nvCxnSpPr>
+          <p:cNvPr id="91" name="Gerade Verbindung mit Pfeil 231">
+            <a:extLst>
+              <a:ext uri="{FF2B5EF4-FFF2-40B4-BE49-F238E27FC236}">
+                <a16:creationId xmlns:a16="http://schemas.microsoft.com/office/drawing/2014/main" id="{CCD4E548-36D7-4EF0-B5BE-A93853BC20D1}"/>
+              </a:ext>
+            </a:extLst>
+          </p:cNvPr>
+          <p:cNvCxnSpPr>
+            <a:cxnSpLocks/>
+            <a:stCxn id="52" idx="3"/>
+            <a:endCxn id="49" idx="1"/>
+          </p:cNvCxnSpPr>
+          <p:nvPr/>
+        </p:nvCxnSpPr>
+        <p:spPr>
+          <a:xfrm>
+            <a:off x="4542308" y="5250936"/>
+            <a:ext cx="304942" cy="2864"/>
+          </a:xfrm>
+          <a:prstGeom prst="straightConnector1">
+            <a:avLst/>
+          </a:prstGeom>
+          <a:ln>
+            <a:solidFill>
+              <a:schemeClr val="bg1">
+                <a:lumMod val="50000"/>
+              </a:schemeClr>
+            </a:solidFill>
+            <a:tailEnd type="triangle"/>
+          </a:ln>
+        </p:spPr>
+        <p:style>
+          <a:lnRef idx="1">
+            <a:schemeClr val="accent1"/>
+          </a:lnRef>
+          <a:fillRef idx="0">
+            <a:schemeClr val="accent1"/>
+          </a:fillRef>
+          <a:effectRef idx="0">
+            <a:schemeClr val="accent1"/>
+          </a:effectRef>
+          <a:fontRef idx="minor">
+            <a:schemeClr val="tx1"/>
+          </a:fontRef>
+        </p:style>
+      </p:cxnSp>
+      <p:cxnSp>
+        <p:nvCxnSpPr>
+          <p:cNvPr id="95" name="Gerade Verbindung mit Pfeil 231">
+            <a:extLst>
+              <a:ext uri="{FF2B5EF4-FFF2-40B4-BE49-F238E27FC236}">
+                <a16:creationId xmlns:a16="http://schemas.microsoft.com/office/drawing/2014/main" id="{4AB81474-2282-434E-B3EC-524B03561A7C}"/>
+              </a:ext>
+            </a:extLst>
+          </p:cNvPr>
+          <p:cNvCxnSpPr>
+            <a:cxnSpLocks/>
+            <a:endCxn id="48" idx="2"/>
+          </p:cNvCxnSpPr>
+          <p:nvPr/>
+        </p:nvCxnSpPr>
+        <p:spPr>
+          <a:xfrm flipV="1">
+            <a:off x="4022104" y="4839539"/>
+            <a:ext cx="0" cy="205550"/>
+          </a:xfrm>
+          <a:prstGeom prst="straightConnector1">
+            <a:avLst/>
+          </a:prstGeom>
+          <a:ln>
+            <a:solidFill>
+              <a:schemeClr val="bg1">
+                <a:lumMod val="50000"/>
+              </a:schemeClr>
+            </a:solidFill>
+            <a:tailEnd type="triangle"/>
+          </a:ln>
+        </p:spPr>
+        <p:style>
+          <a:lnRef idx="1">
+            <a:schemeClr val="accent1"/>
+          </a:lnRef>
+          <a:fillRef idx="0">
+            <a:schemeClr val="accent1"/>
+          </a:fillRef>
+          <a:effectRef idx="0">
+            <a:schemeClr val="accent1"/>
+          </a:effectRef>
+          <a:fontRef idx="minor">
+            <a:schemeClr val="tx1"/>
+          </a:fontRef>
+        </p:style>
+      </p:cxnSp>
+      <p:cxnSp>
+        <p:nvCxnSpPr>
+          <p:cNvPr id="98" name="Gerade Verbindung mit Pfeil 63">
+            <a:extLst>
+              <a:ext uri="{FF2B5EF4-FFF2-40B4-BE49-F238E27FC236}">
+                <a16:creationId xmlns:a16="http://schemas.microsoft.com/office/drawing/2014/main" id="{FC68DFE9-25F0-41C6-B71F-3ECCFFCB5571}"/>
+              </a:ext>
+            </a:extLst>
+          </p:cNvPr>
+          <p:cNvCxnSpPr>
+            <a:cxnSpLocks/>
+            <a:stCxn id="58" idx="1"/>
+            <a:endCxn id="47" idx="3"/>
+          </p:cNvCxnSpPr>
+          <p:nvPr/>
+        </p:nvCxnSpPr>
+        <p:spPr>
+          <a:xfrm flipH="1" flipV="1">
+            <a:off x="4544845" y="4151495"/>
+            <a:ext cx="723695" cy="16107"/>
+          </a:xfrm>
+          <a:prstGeom prst="straightConnector1">
+            <a:avLst/>
+          </a:prstGeom>
+          <a:ln>
+            <a:solidFill>
+              <a:schemeClr val="bg1">
+                <a:lumMod val="50000"/>
+              </a:schemeClr>
+            </a:solidFill>
+            <a:tailEnd type="triangle"/>
+          </a:ln>
+        </p:spPr>
+        <p:style>
+          <a:lnRef idx="1">
+            <a:schemeClr val="accent1"/>
+          </a:lnRef>
+          <a:fillRef idx="0">
+            <a:schemeClr val="accent1"/>
+          </a:fillRef>
+          <a:effectRef idx="0">
+            <a:schemeClr val="accent1"/>
+          </a:effectRef>
+          <a:fontRef idx="minor">
+            <a:schemeClr val="tx1"/>
+          </a:fontRef>
+        </p:style>
+      </p:cxnSp>
+      <p:cxnSp>
+        <p:nvCxnSpPr>
+          <p:cNvPr id="101" name="Gerade Verbindung mit Pfeil 63">
+            <a:extLst>
+              <a:ext uri="{FF2B5EF4-FFF2-40B4-BE49-F238E27FC236}">
+                <a16:creationId xmlns:a16="http://schemas.microsoft.com/office/drawing/2014/main" id="{7B7C728D-183B-4D53-950B-9FA218010A3D}"/>
+              </a:ext>
+            </a:extLst>
+          </p:cNvPr>
+          <p:cNvCxnSpPr>
+            <a:cxnSpLocks/>
+            <a:stCxn id="58" idx="1"/>
+            <a:endCxn id="48" idx="3"/>
+          </p:cNvCxnSpPr>
+          <p:nvPr/>
+        </p:nvCxnSpPr>
+        <p:spPr>
+          <a:xfrm flipH="1">
+            <a:off x="4542309" y="4167602"/>
+            <a:ext cx="726231" cy="473937"/>
+          </a:xfrm>
+          <a:prstGeom prst="straightConnector1">
+            <a:avLst/>
+          </a:prstGeom>
+          <a:ln>
+            <a:solidFill>
+              <a:schemeClr val="bg1">
+                <a:lumMod val="50000"/>
+              </a:schemeClr>
+            </a:solidFill>
+            <a:tailEnd type="triangle"/>
+          </a:ln>
+        </p:spPr>
+        <p:style>
+          <a:lnRef idx="1">
+            <a:schemeClr val="accent1"/>
+          </a:lnRef>
+          <a:fillRef idx="0">
+            <a:schemeClr val="accent1"/>
+          </a:fillRef>
+          <a:effectRef idx="0">
+            <a:schemeClr val="accent1"/>
           </a:effectRef>
           <a:fontRef idx="minor">
             <a:schemeClr val="tx1"/>
@@ -5184,7 +5734,7 @@
         <a:srgbClr val="E7E6E6"/>
       </a:lt2>
       <a:accent1>
-        <a:srgbClr val="5B9BD5"/>
+        <a:srgbClr val="4472C4"/>
       </a:accent1>
       <a:accent2>
         <a:srgbClr val="ED7D31"/>
@@ -5196,7 +5746,7 @@
         <a:srgbClr val="FFC000"/>
       </a:accent4>
       <a:accent5>
-        <a:srgbClr val="4472C4"/>
+        <a:srgbClr val="5B9BD5"/>
       </a:accent5>
       <a:accent6>
         <a:srgbClr val="70AD47"/>
@@ -5213,9 +5763,9 @@
         <a:latin typeface="Calibri Light" panose="020F0302020204030204"/>
         <a:ea typeface=""/>
         <a:cs typeface=""/>
-        <a:font script="Jpan" typeface="ＭＳ Ｐゴシック"/>
+        <a:font script="Jpan" typeface="游ゴシック Light"/>
         <a:font script="Hang" typeface="맑은 고딕"/>
-        <a:font script="Hans" typeface="宋体"/>
+        <a:font script="Hans" typeface="等线 Light"/>
         <a:font script="Hant" typeface="新細明體"/>
         <a:font script="Arab" typeface="Times New Roman"/>
         <a:font script="Hebr" typeface="Times New Roman"/>
@@ -5248,9 +5798,9 @@
         <a:latin typeface="Calibri" panose="020F0502020204030204"/>
         <a:ea typeface=""/>
         <a:cs typeface=""/>
-        <a:font script="Jpan" typeface="ＭＳ Ｐゴシック"/>
+        <a:font script="Jpan" typeface="游ゴシック"/>
         <a:font script="Hang" typeface="맑은 고딕"/>
-        <a:font script="Hans" typeface="宋体"/>
+        <a:font script="Hans" typeface="等线"/>
         <a:font script="Hant" typeface="新細明體"/>
         <a:font script="Arab" typeface="Arial"/>
         <a:font script="Hebr" typeface="Arial"/>

</xml_diff>